<commit_message>
Expanded empCpd annotation; updated datastru figure
</commit_message>
<xml_diff>
--- a/docs/DataModel-illustration-202401-SL.pptx
+++ b/docs/DataModel-illustration-202401-SL.pptx
@@ -199,7 +199,7 @@
           <a:p>
             <a:fld id="{4586D0CB-DAA0-9447-9AAF-32C53A9AFED5}" type="datetimeFigureOut">
               <a:rPr lang="en-US" smtClean="0"/>
-              <a:t>1/16/24</a:t>
+              <a:t>11/17/25</a:t>
             </a:fld>
             <a:endParaRPr lang="en-US"/>
           </a:p>
@@ -719,7 +719,7 @@
           <a:p>
             <a:fld id="{DC67EFC9-DECF-5B45-BE5A-207EC87BD6EF}" type="datetimeFigureOut">
               <a:rPr lang="en-US" smtClean="0"/>
-              <a:t>1/16/24</a:t>
+              <a:t>11/17/25</a:t>
             </a:fld>
             <a:endParaRPr lang="en-US"/>
           </a:p>
@@ -887,7 +887,7 @@
           <a:p>
             <a:fld id="{DC67EFC9-DECF-5B45-BE5A-207EC87BD6EF}" type="datetimeFigureOut">
               <a:rPr lang="en-US" smtClean="0"/>
-              <a:t>1/16/24</a:t>
+              <a:t>11/17/25</a:t>
             </a:fld>
             <a:endParaRPr lang="en-US"/>
           </a:p>
@@ -1065,7 +1065,7 @@
           <a:p>
             <a:fld id="{DC67EFC9-DECF-5B45-BE5A-207EC87BD6EF}" type="datetimeFigureOut">
               <a:rPr lang="en-US" smtClean="0"/>
-              <a:t>1/16/24</a:t>
+              <a:t>11/17/25</a:t>
             </a:fld>
             <a:endParaRPr lang="en-US"/>
           </a:p>
@@ -1233,7 +1233,7 @@
           <a:p>
             <a:fld id="{DC67EFC9-DECF-5B45-BE5A-207EC87BD6EF}" type="datetimeFigureOut">
               <a:rPr lang="en-US" smtClean="0"/>
-              <a:t>1/16/24</a:t>
+              <a:t>11/17/25</a:t>
             </a:fld>
             <a:endParaRPr lang="en-US"/>
           </a:p>
@@ -1478,7 +1478,7 @@
           <a:p>
             <a:fld id="{DC67EFC9-DECF-5B45-BE5A-207EC87BD6EF}" type="datetimeFigureOut">
               <a:rPr lang="en-US" smtClean="0"/>
-              <a:t>1/16/24</a:t>
+              <a:t>11/17/25</a:t>
             </a:fld>
             <a:endParaRPr lang="en-US"/>
           </a:p>
@@ -1707,7 +1707,7 @@
           <a:p>
             <a:fld id="{DC67EFC9-DECF-5B45-BE5A-207EC87BD6EF}" type="datetimeFigureOut">
               <a:rPr lang="en-US" smtClean="0"/>
-              <a:t>1/16/24</a:t>
+              <a:t>11/17/25</a:t>
             </a:fld>
             <a:endParaRPr lang="en-US"/>
           </a:p>
@@ -2071,7 +2071,7 @@
           <a:p>
             <a:fld id="{DC67EFC9-DECF-5B45-BE5A-207EC87BD6EF}" type="datetimeFigureOut">
               <a:rPr lang="en-US" smtClean="0"/>
-              <a:t>1/16/24</a:t>
+              <a:t>11/17/25</a:t>
             </a:fld>
             <a:endParaRPr lang="en-US"/>
           </a:p>
@@ -2188,7 +2188,7 @@
           <a:p>
             <a:fld id="{DC67EFC9-DECF-5B45-BE5A-207EC87BD6EF}" type="datetimeFigureOut">
               <a:rPr lang="en-US" smtClean="0"/>
-              <a:t>1/16/24</a:t>
+              <a:t>11/17/25</a:t>
             </a:fld>
             <a:endParaRPr lang="en-US"/>
           </a:p>
@@ -2283,7 +2283,7 @@
           <a:p>
             <a:fld id="{DC67EFC9-DECF-5B45-BE5A-207EC87BD6EF}" type="datetimeFigureOut">
               <a:rPr lang="en-US" smtClean="0"/>
-              <a:t>1/16/24</a:t>
+              <a:t>11/17/25</a:t>
             </a:fld>
             <a:endParaRPr lang="en-US"/>
           </a:p>
@@ -2558,7 +2558,7 @@
           <a:p>
             <a:fld id="{DC67EFC9-DECF-5B45-BE5A-207EC87BD6EF}" type="datetimeFigureOut">
               <a:rPr lang="en-US" smtClean="0"/>
-              <a:t>1/16/24</a:t>
+              <a:t>11/17/25</a:t>
             </a:fld>
             <a:endParaRPr lang="en-US"/>
           </a:p>
@@ -2810,7 +2810,7 @@
           <a:p>
             <a:fld id="{DC67EFC9-DECF-5B45-BE5A-207EC87BD6EF}" type="datetimeFigureOut">
               <a:rPr lang="en-US" smtClean="0"/>
-              <a:t>1/16/24</a:t>
+              <a:t>11/17/25</a:t>
             </a:fld>
             <a:endParaRPr lang="en-US"/>
           </a:p>
@@ -3021,7 +3021,7 @@
           <a:p>
             <a:fld id="{DC67EFC9-DECF-5B45-BE5A-207EC87BD6EF}" type="datetimeFigureOut">
               <a:rPr lang="en-US" smtClean="0"/>
-              <a:t>1/16/24</a:t>
+              <a:t>11/17/25</a:t>
             </a:fld>
             <a:endParaRPr lang="en-US"/>
           </a:p>
@@ -3426,1322 +3426,1301 @@
           <a:chExt cx="0" cy="0"/>
         </a:xfrm>
       </p:grpSpPr>
-      <p:grpSp>
-        <p:nvGrpSpPr>
-          <p:cNvPr id="2" name="Group 1">
+      <p:sp>
+        <p:nvSpPr>
+          <p:cNvPr id="3" name="TextBox 2">
             <a:extLst>
               <a:ext uri="{FF2B5EF4-FFF2-40B4-BE49-F238E27FC236}">
-                <a16:creationId xmlns:a16="http://schemas.microsoft.com/office/drawing/2014/main" id="{602C13C3-0A9A-9354-2DE6-8BB0B40FDA40}"/>
+                <a16:creationId xmlns:a16="http://schemas.microsoft.com/office/drawing/2014/main" id="{78FCB24E-63A2-C93A-F053-DB24A870665B}"/>
               </a:ext>
             </a:extLst>
           </p:cNvPr>
-          <p:cNvGrpSpPr/>
-          <p:nvPr/>
-        </p:nvGrpSpPr>
-        <p:grpSpPr>
+          <p:cNvSpPr txBox="1"/>
+          <p:nvPr/>
+        </p:nvSpPr>
+        <p:spPr>
+          <a:xfrm>
+            <a:off x="5304175" y="4531811"/>
+            <a:ext cx="848502" cy="270843"/>
+          </a:xfrm>
+          <a:prstGeom prst="rect">
+            <a:avLst/>
+          </a:prstGeom>
+          <a:noFill/>
+        </p:spPr>
+        <p:txBody>
+          <a:bodyPr wrap="none" rtlCol="0">
+            <a:noAutofit/>
+          </a:bodyPr>
+          <a:lstStyle/>
+          <a:p>
+            <a:r>
+              <a:rPr lang="en-US" sz="1100" dirty="0"/>
+              <a:t>Annotation</a:t>
+            </a:r>
+          </a:p>
+        </p:txBody>
+      </p:sp>
+      <p:sp>
+        <p:nvSpPr>
+          <p:cNvPr id="4" name="TextBox 3">
+            <a:extLst>
+              <a:ext uri="{FF2B5EF4-FFF2-40B4-BE49-F238E27FC236}">
+                <a16:creationId xmlns:a16="http://schemas.microsoft.com/office/drawing/2014/main" id="{A530D6E5-C437-FAA2-49BD-1156637A306F}"/>
+              </a:ext>
+            </a:extLst>
+          </p:cNvPr>
+          <p:cNvSpPr txBox="1"/>
+          <p:nvPr/>
+        </p:nvSpPr>
+        <p:spPr>
+          <a:xfrm>
+            <a:off x="6184755" y="1798300"/>
+            <a:ext cx="1252422" cy="270843"/>
+          </a:xfrm>
+          <a:prstGeom prst="rect">
+            <a:avLst/>
+          </a:prstGeom>
+          <a:noFill/>
+        </p:spPr>
+        <p:txBody>
+          <a:bodyPr wrap="square">
+            <a:noAutofit/>
+          </a:bodyPr>
+          <a:lstStyle/>
+          <a:p>
+            <a:pPr algn="ctr"/>
+            <a:r>
+              <a:rPr lang="en-US" sz="1100" dirty="0"/>
+              <a:t>Metabolic Model</a:t>
+            </a:r>
+          </a:p>
+        </p:txBody>
+      </p:sp>
+      <p:sp>
+        <p:nvSpPr>
+          <p:cNvPr id="5" name="TextBox 4">
+            <a:extLst>
+              <a:ext uri="{FF2B5EF4-FFF2-40B4-BE49-F238E27FC236}">
+                <a16:creationId xmlns:a16="http://schemas.microsoft.com/office/drawing/2014/main" id="{9A884B3E-E136-12A5-EB5A-8559632614E3}"/>
+              </a:ext>
+            </a:extLst>
+          </p:cNvPr>
+          <p:cNvSpPr txBox="1"/>
+          <p:nvPr/>
+        </p:nvSpPr>
+        <p:spPr>
+          <a:xfrm>
+            <a:off x="3378834" y="4190039"/>
+            <a:ext cx="1084784" cy="270843"/>
+          </a:xfrm>
+          <a:prstGeom prst="rect">
+            <a:avLst/>
+          </a:prstGeom>
+          <a:noFill/>
+        </p:spPr>
+        <p:txBody>
+          <a:bodyPr wrap="none" rtlCol="0">
+            <a:noAutofit/>
+          </a:bodyPr>
+          <a:lstStyle/>
+          <a:p>
+            <a:pPr algn="ctr"/>
+            <a:r>
+              <a:rPr lang="en-US" sz="1100" dirty="0"/>
+              <a:t>Pre-annotation</a:t>
+            </a:r>
+          </a:p>
+        </p:txBody>
+      </p:sp>
+      <p:sp>
+        <p:nvSpPr>
+          <p:cNvPr id="6" name="TextBox 5">
+            <a:extLst>
+              <a:ext uri="{FF2B5EF4-FFF2-40B4-BE49-F238E27FC236}">
+                <a16:creationId xmlns:a16="http://schemas.microsoft.com/office/drawing/2014/main" id="{CE378AFE-C24E-414A-038A-F9837623B91D}"/>
+              </a:ext>
+            </a:extLst>
+          </p:cNvPr>
+          <p:cNvSpPr txBox="1"/>
+          <p:nvPr/>
+        </p:nvSpPr>
+        <p:spPr>
+          <a:xfrm>
+            <a:off x="3921226" y="4586672"/>
+            <a:ext cx="1005840" cy="440121"/>
+          </a:xfrm>
+          <a:prstGeom prst="rect">
+            <a:avLst/>
+          </a:prstGeom>
+          <a:noFill/>
+          <a:ln>
+            <a:solidFill>
+              <a:schemeClr val="bg1">
+                <a:lumMod val="50000"/>
+              </a:schemeClr>
+            </a:solidFill>
+          </a:ln>
+        </p:spPr>
+        <p:txBody>
+          <a:bodyPr wrap="none" rtlCol="0">
+            <a:noAutofit/>
+          </a:bodyPr>
+          <a:lstStyle/>
+          <a:p>
+            <a:pPr algn="ctr"/>
+            <a:r>
+              <a:rPr lang="en-US" sz="1100" dirty="0"/>
+              <a:t>Empirical</a:t>
+            </a:r>
+            <a:br>
+              <a:rPr lang="en-US" sz="1100" dirty="0"/>
+            </a:br>
+            <a:r>
+              <a:rPr lang="en-US" sz="1100" dirty="0"/>
+              <a:t>Compound</a:t>
+            </a:r>
+          </a:p>
+        </p:txBody>
+      </p:sp>
+      <p:sp>
+        <p:nvSpPr>
+          <p:cNvPr id="7" name="TextBox 6">
+            <a:extLst>
+              <a:ext uri="{FF2B5EF4-FFF2-40B4-BE49-F238E27FC236}">
+                <a16:creationId xmlns:a16="http://schemas.microsoft.com/office/drawing/2014/main" id="{B3D0001F-8990-DE84-B6B6-6D3833B971B2}"/>
+              </a:ext>
+            </a:extLst>
+          </p:cNvPr>
+          <p:cNvSpPr txBox="1"/>
+          <p:nvPr/>
+        </p:nvSpPr>
+        <p:spPr>
+          <a:xfrm>
+            <a:off x="3921226" y="3055037"/>
+            <a:ext cx="1005840" cy="270843"/>
+          </a:xfrm>
+          <a:prstGeom prst="rect">
+            <a:avLst/>
+          </a:prstGeom>
+          <a:noFill/>
+          <a:ln>
+            <a:solidFill>
+              <a:schemeClr val="bg1">
+                <a:lumMod val="50000"/>
+              </a:schemeClr>
+            </a:solidFill>
+          </a:ln>
+        </p:spPr>
+        <p:txBody>
+          <a:bodyPr wrap="square" rtlCol="0">
+            <a:noAutofit/>
+          </a:bodyPr>
+          <a:lstStyle/>
+          <a:p>
+            <a:pPr algn="ctr"/>
+            <a:r>
+              <a:rPr lang="en-US" sz="1100" dirty="0"/>
+              <a:t>Elution Peak</a:t>
+            </a:r>
+          </a:p>
+        </p:txBody>
+      </p:sp>
+      <p:sp>
+        <p:nvSpPr>
+          <p:cNvPr id="8" name="TextBox 7">
+            <a:extLst>
+              <a:ext uri="{FF2B5EF4-FFF2-40B4-BE49-F238E27FC236}">
+                <a16:creationId xmlns:a16="http://schemas.microsoft.com/office/drawing/2014/main" id="{C3AFA4FE-4E8C-CA15-612D-F66525FF49CB}"/>
+              </a:ext>
+            </a:extLst>
+          </p:cNvPr>
+          <p:cNvSpPr txBox="1"/>
+          <p:nvPr/>
+        </p:nvSpPr>
+        <p:spPr>
+          <a:xfrm>
+            <a:off x="3921226" y="3841105"/>
+            <a:ext cx="1005840" cy="270843"/>
+          </a:xfrm>
+          <a:prstGeom prst="rect">
+            <a:avLst/>
+          </a:prstGeom>
+          <a:noFill/>
+          <a:ln>
+            <a:solidFill>
+              <a:schemeClr val="bg1">
+                <a:lumMod val="50000"/>
+              </a:schemeClr>
+            </a:solidFill>
+          </a:ln>
+        </p:spPr>
+        <p:txBody>
+          <a:bodyPr wrap="none" rtlCol="0">
+            <a:noAutofit/>
+          </a:bodyPr>
+          <a:lstStyle/>
+          <a:p>
+            <a:pPr algn="ctr"/>
+            <a:r>
+              <a:rPr lang="en-US" sz="1100" dirty="0"/>
+              <a:t>Feature</a:t>
+            </a:r>
+          </a:p>
+        </p:txBody>
+      </p:sp>
+      <p:sp>
+        <p:nvSpPr>
+          <p:cNvPr id="9" name="TextBox 8">
+            <a:extLst>
+              <a:ext uri="{FF2B5EF4-FFF2-40B4-BE49-F238E27FC236}">
+                <a16:creationId xmlns:a16="http://schemas.microsoft.com/office/drawing/2014/main" id="{A3E98601-2D9D-354A-FF9D-A28D06955C78}"/>
+              </a:ext>
+            </a:extLst>
+          </p:cNvPr>
+          <p:cNvSpPr txBox="1"/>
+          <p:nvPr/>
+        </p:nvSpPr>
+        <p:spPr>
+          <a:xfrm>
+            <a:off x="3921226" y="2281662"/>
+            <a:ext cx="1005840" cy="270843"/>
+          </a:xfrm>
+          <a:prstGeom prst="rect">
+            <a:avLst/>
+          </a:prstGeom>
+          <a:noFill/>
+          <a:ln>
+            <a:solidFill>
+              <a:schemeClr val="bg1">
+                <a:lumMod val="50000"/>
+              </a:schemeClr>
+            </a:solidFill>
+          </a:ln>
+        </p:spPr>
+        <p:txBody>
+          <a:bodyPr wrap="none" rtlCol="0">
+            <a:noAutofit/>
+          </a:bodyPr>
+          <a:lstStyle/>
+          <a:p>
+            <a:pPr algn="ctr"/>
+            <a:r>
+              <a:rPr lang="en-US" sz="1100" dirty="0"/>
+              <a:t>Mass track (EIC)</a:t>
+            </a:r>
+          </a:p>
+        </p:txBody>
+      </p:sp>
+      <p:sp>
+        <p:nvSpPr>
+          <p:cNvPr id="10" name="TextBox 9">
+            <a:extLst>
+              <a:ext uri="{FF2B5EF4-FFF2-40B4-BE49-F238E27FC236}">
+                <a16:creationId xmlns:a16="http://schemas.microsoft.com/office/drawing/2014/main" id="{A50F00D6-B351-1FF1-D218-F7C27AEE6C10}"/>
+              </a:ext>
+            </a:extLst>
+          </p:cNvPr>
+          <p:cNvSpPr txBox="1"/>
+          <p:nvPr/>
+        </p:nvSpPr>
+        <p:spPr>
+          <a:xfrm>
+            <a:off x="2725003" y="1798300"/>
+            <a:ext cx="1399780" cy="288730"/>
+          </a:xfrm>
+          <a:prstGeom prst="rect">
+            <a:avLst/>
+          </a:prstGeom>
+          <a:noFill/>
+        </p:spPr>
+        <p:txBody>
+          <a:bodyPr wrap="none" rtlCol="0">
+            <a:noAutofit/>
+          </a:bodyPr>
+          <a:lstStyle/>
+          <a:p>
+            <a:pPr algn="ctr"/>
+            <a:r>
+              <a:rPr lang="en-US" sz="1100" dirty="0"/>
+              <a:t>Separation parameters</a:t>
+            </a:r>
+          </a:p>
+        </p:txBody>
+      </p:sp>
+      <p:sp>
+        <p:nvSpPr>
+          <p:cNvPr id="11" name="TextBox 10">
+            <a:extLst>
+              <a:ext uri="{FF2B5EF4-FFF2-40B4-BE49-F238E27FC236}">
+                <a16:creationId xmlns:a16="http://schemas.microsoft.com/office/drawing/2014/main" id="{BF18400E-4361-658F-3463-7F8679E4BF82}"/>
+              </a:ext>
+            </a:extLst>
+          </p:cNvPr>
+          <p:cNvSpPr txBox="1"/>
+          <p:nvPr/>
+        </p:nvSpPr>
+        <p:spPr>
           <a:xfrm>
             <a:off x="2197156" y="1404670"/>
-            <a:ext cx="6542841" cy="4048659"/>
-            <a:chOff x="434457" y="376576"/>
-            <a:chExt cx="6542841" cy="4048659"/>
-          </a:xfrm>
-        </p:grpSpPr>
-        <p:sp>
-          <p:nvSpPr>
-            <p:cNvPr id="3" name="TextBox 2">
-              <a:extLst>
-                <a:ext uri="{FF2B5EF4-FFF2-40B4-BE49-F238E27FC236}">
-                  <a16:creationId xmlns:a16="http://schemas.microsoft.com/office/drawing/2014/main" id="{78FCB24E-63A2-C93A-F053-DB24A870665B}"/>
-                </a:ext>
-              </a:extLst>
-            </p:cNvPr>
-            <p:cNvSpPr txBox="1"/>
-            <p:nvPr/>
-          </p:nvSpPr>
-          <p:spPr>
-            <a:xfrm>
-              <a:off x="3541476" y="3503717"/>
-              <a:ext cx="848502" cy="270843"/>
-            </a:xfrm>
-            <a:prstGeom prst="rect">
-              <a:avLst/>
-            </a:prstGeom>
-            <a:noFill/>
-          </p:spPr>
-          <p:txBody>
-            <a:bodyPr wrap="none" rtlCol="0">
-              <a:noAutofit/>
-            </a:bodyPr>
-            <a:lstStyle/>
-            <a:p>
-              <a:r>
-                <a:rPr lang="en-US" sz="1100" dirty="0"/>
-                <a:t>Annotation</a:t>
-              </a:r>
-            </a:p>
-          </p:txBody>
-        </p:sp>
-        <p:sp>
-          <p:nvSpPr>
-            <p:cNvPr id="4" name="TextBox 3">
-              <a:extLst>
-                <a:ext uri="{FF2B5EF4-FFF2-40B4-BE49-F238E27FC236}">
-                  <a16:creationId xmlns:a16="http://schemas.microsoft.com/office/drawing/2014/main" id="{A530D6E5-C437-FAA2-49BD-1156637A306F}"/>
-                </a:ext>
-              </a:extLst>
-            </p:cNvPr>
-            <p:cNvSpPr txBox="1"/>
-            <p:nvPr/>
-          </p:nvSpPr>
-          <p:spPr>
-            <a:xfrm>
-              <a:off x="4422056" y="770206"/>
-              <a:ext cx="1252422" cy="270843"/>
-            </a:xfrm>
-            <a:prstGeom prst="rect">
-              <a:avLst/>
-            </a:prstGeom>
-            <a:noFill/>
-          </p:spPr>
-          <p:txBody>
-            <a:bodyPr wrap="square">
-              <a:noAutofit/>
-            </a:bodyPr>
-            <a:lstStyle/>
-            <a:p>
-              <a:pPr algn="ctr"/>
-              <a:r>
-                <a:rPr lang="en-US" sz="1100" dirty="0"/>
-                <a:t>Metabolic Model</a:t>
-              </a:r>
-            </a:p>
-          </p:txBody>
-        </p:sp>
-        <p:sp>
-          <p:nvSpPr>
-            <p:cNvPr id="5" name="TextBox 4">
-              <a:extLst>
-                <a:ext uri="{FF2B5EF4-FFF2-40B4-BE49-F238E27FC236}">
-                  <a16:creationId xmlns:a16="http://schemas.microsoft.com/office/drawing/2014/main" id="{9A884B3E-E136-12A5-EB5A-8559632614E3}"/>
-                </a:ext>
-              </a:extLst>
-            </p:cNvPr>
-            <p:cNvSpPr txBox="1"/>
-            <p:nvPr/>
-          </p:nvSpPr>
-          <p:spPr>
-            <a:xfrm>
-              <a:off x="1616135" y="3161945"/>
-              <a:ext cx="1084784" cy="270843"/>
-            </a:xfrm>
-            <a:prstGeom prst="rect">
-              <a:avLst/>
-            </a:prstGeom>
-            <a:noFill/>
-          </p:spPr>
-          <p:txBody>
-            <a:bodyPr wrap="none" rtlCol="0">
-              <a:noAutofit/>
-            </a:bodyPr>
-            <a:lstStyle/>
-            <a:p>
-              <a:pPr algn="ctr"/>
-              <a:r>
-                <a:rPr lang="en-US" sz="1100" dirty="0"/>
-                <a:t>Pre-annotation</a:t>
-              </a:r>
-            </a:p>
-          </p:txBody>
-        </p:sp>
-        <p:sp>
-          <p:nvSpPr>
-            <p:cNvPr id="6" name="TextBox 5">
-              <a:extLst>
-                <a:ext uri="{FF2B5EF4-FFF2-40B4-BE49-F238E27FC236}">
-                  <a16:creationId xmlns:a16="http://schemas.microsoft.com/office/drawing/2014/main" id="{CE378AFE-C24E-414A-038A-F9837623B91D}"/>
-                </a:ext>
-              </a:extLst>
-            </p:cNvPr>
-            <p:cNvSpPr txBox="1"/>
-            <p:nvPr/>
-          </p:nvSpPr>
-          <p:spPr>
-            <a:xfrm>
-              <a:off x="2158527" y="3558578"/>
-              <a:ext cx="1005840" cy="440121"/>
-            </a:xfrm>
-            <a:prstGeom prst="rect">
-              <a:avLst/>
-            </a:prstGeom>
-            <a:noFill/>
-            <a:ln>
-              <a:solidFill>
-                <a:schemeClr val="bg1">
-                  <a:lumMod val="50000"/>
-                </a:schemeClr>
-              </a:solidFill>
-            </a:ln>
-          </p:spPr>
-          <p:txBody>
-            <a:bodyPr wrap="none" rtlCol="0">
-              <a:noAutofit/>
-            </a:bodyPr>
-            <a:lstStyle/>
-            <a:p>
-              <a:pPr algn="ctr"/>
-              <a:r>
-                <a:rPr lang="en-US" sz="1100" dirty="0"/>
-                <a:t>Empirical</a:t>
-              </a:r>
-              <a:br>
-                <a:rPr lang="en-US" sz="1100" dirty="0"/>
-              </a:br>
-              <a:r>
-                <a:rPr lang="en-US" sz="1100" dirty="0"/>
-                <a:t>Compound</a:t>
-              </a:r>
-            </a:p>
-          </p:txBody>
-        </p:sp>
-        <p:sp>
-          <p:nvSpPr>
-            <p:cNvPr id="7" name="TextBox 6">
-              <a:extLst>
-                <a:ext uri="{FF2B5EF4-FFF2-40B4-BE49-F238E27FC236}">
-                  <a16:creationId xmlns:a16="http://schemas.microsoft.com/office/drawing/2014/main" id="{B3D0001F-8990-DE84-B6B6-6D3833B971B2}"/>
-                </a:ext>
-              </a:extLst>
-            </p:cNvPr>
-            <p:cNvSpPr txBox="1"/>
-            <p:nvPr/>
-          </p:nvSpPr>
-          <p:spPr>
-            <a:xfrm>
-              <a:off x="2158527" y="2026943"/>
-              <a:ext cx="1005840" cy="270843"/>
-            </a:xfrm>
-            <a:prstGeom prst="rect">
-              <a:avLst/>
-            </a:prstGeom>
-            <a:noFill/>
-            <a:ln>
-              <a:solidFill>
-                <a:schemeClr val="bg1">
-                  <a:lumMod val="50000"/>
-                </a:schemeClr>
-              </a:solidFill>
-            </a:ln>
-          </p:spPr>
-          <p:txBody>
-            <a:bodyPr wrap="square" rtlCol="0">
-              <a:noAutofit/>
-            </a:bodyPr>
-            <a:lstStyle/>
-            <a:p>
-              <a:pPr algn="ctr"/>
-              <a:r>
-                <a:rPr lang="en-US" sz="1100" dirty="0"/>
-                <a:t>Elution Peak</a:t>
-              </a:r>
-            </a:p>
-          </p:txBody>
-        </p:sp>
-        <p:sp>
-          <p:nvSpPr>
-            <p:cNvPr id="8" name="TextBox 7">
-              <a:extLst>
-                <a:ext uri="{FF2B5EF4-FFF2-40B4-BE49-F238E27FC236}">
-                  <a16:creationId xmlns:a16="http://schemas.microsoft.com/office/drawing/2014/main" id="{C3AFA4FE-4E8C-CA15-612D-F66525FF49CB}"/>
-                </a:ext>
-              </a:extLst>
-            </p:cNvPr>
-            <p:cNvSpPr txBox="1"/>
-            <p:nvPr/>
-          </p:nvSpPr>
-          <p:spPr>
-            <a:xfrm>
-              <a:off x="2158527" y="2813011"/>
-              <a:ext cx="1005840" cy="270843"/>
-            </a:xfrm>
-            <a:prstGeom prst="rect">
-              <a:avLst/>
-            </a:prstGeom>
-            <a:noFill/>
-            <a:ln>
-              <a:solidFill>
-                <a:schemeClr val="bg1">
-                  <a:lumMod val="50000"/>
-                </a:schemeClr>
-              </a:solidFill>
-            </a:ln>
-          </p:spPr>
-          <p:txBody>
-            <a:bodyPr wrap="none" rtlCol="0">
-              <a:noAutofit/>
-            </a:bodyPr>
-            <a:lstStyle/>
-            <a:p>
-              <a:pPr algn="ctr"/>
-              <a:r>
-                <a:rPr lang="en-US" sz="1100" dirty="0"/>
-                <a:t>Feature</a:t>
-              </a:r>
-            </a:p>
-          </p:txBody>
-        </p:sp>
-        <p:sp>
-          <p:nvSpPr>
-            <p:cNvPr id="9" name="TextBox 8">
-              <a:extLst>
-                <a:ext uri="{FF2B5EF4-FFF2-40B4-BE49-F238E27FC236}">
-                  <a16:creationId xmlns:a16="http://schemas.microsoft.com/office/drawing/2014/main" id="{A3E98601-2D9D-354A-FF9D-A28D06955C78}"/>
-                </a:ext>
-              </a:extLst>
-            </p:cNvPr>
-            <p:cNvSpPr txBox="1"/>
-            <p:nvPr/>
-          </p:nvSpPr>
-          <p:spPr>
-            <a:xfrm>
-              <a:off x="2158527" y="1253568"/>
-              <a:ext cx="1005840" cy="270843"/>
-            </a:xfrm>
-            <a:prstGeom prst="rect">
-              <a:avLst/>
-            </a:prstGeom>
-            <a:noFill/>
-            <a:ln>
-              <a:solidFill>
-                <a:schemeClr val="bg1">
-                  <a:lumMod val="50000"/>
-                </a:schemeClr>
-              </a:solidFill>
-            </a:ln>
-          </p:spPr>
-          <p:txBody>
-            <a:bodyPr wrap="none" rtlCol="0">
-              <a:noAutofit/>
-            </a:bodyPr>
-            <a:lstStyle/>
-            <a:p>
-              <a:pPr algn="ctr"/>
-              <a:r>
-                <a:rPr lang="en-US" sz="1100" dirty="0"/>
-                <a:t>Mass track (EIC)</a:t>
-              </a:r>
-            </a:p>
-          </p:txBody>
-        </p:sp>
-        <p:sp>
-          <p:nvSpPr>
-            <p:cNvPr id="10" name="TextBox 9">
-              <a:extLst>
-                <a:ext uri="{FF2B5EF4-FFF2-40B4-BE49-F238E27FC236}">
-                  <a16:creationId xmlns:a16="http://schemas.microsoft.com/office/drawing/2014/main" id="{A50F00D6-B351-1FF1-D218-F7C27AEE6C10}"/>
-                </a:ext>
-              </a:extLst>
-            </p:cNvPr>
-            <p:cNvSpPr txBox="1"/>
-            <p:nvPr/>
-          </p:nvSpPr>
-          <p:spPr>
-            <a:xfrm>
-              <a:off x="962304" y="770206"/>
-              <a:ext cx="1399780" cy="288730"/>
-            </a:xfrm>
-            <a:prstGeom prst="rect">
-              <a:avLst/>
-            </a:prstGeom>
-            <a:noFill/>
-          </p:spPr>
-          <p:txBody>
-            <a:bodyPr wrap="none" rtlCol="0">
-              <a:noAutofit/>
-            </a:bodyPr>
-            <a:lstStyle/>
-            <a:p>
-              <a:pPr algn="ctr"/>
-              <a:r>
-                <a:rPr lang="en-US" sz="1100" dirty="0"/>
-                <a:t>Separation parameters</a:t>
-              </a:r>
-            </a:p>
-          </p:txBody>
-        </p:sp>
-        <p:sp>
-          <p:nvSpPr>
-            <p:cNvPr id="11" name="TextBox 10">
-              <a:extLst>
-                <a:ext uri="{FF2B5EF4-FFF2-40B4-BE49-F238E27FC236}">
-                  <a16:creationId xmlns:a16="http://schemas.microsoft.com/office/drawing/2014/main" id="{BF18400E-4361-658F-3463-7F8679E4BF82}"/>
-                </a:ext>
-              </a:extLst>
-            </p:cNvPr>
-            <p:cNvSpPr txBox="1"/>
-            <p:nvPr/>
-          </p:nvSpPr>
-          <p:spPr>
-            <a:xfrm>
-              <a:off x="434457" y="376576"/>
-              <a:ext cx="1005840" cy="270843"/>
-            </a:xfrm>
-            <a:prstGeom prst="rect">
-              <a:avLst/>
-            </a:prstGeom>
-            <a:noFill/>
-            <a:ln>
-              <a:solidFill>
-                <a:schemeClr val="bg1">
-                  <a:lumMod val="50000"/>
-                </a:schemeClr>
-              </a:solidFill>
-            </a:ln>
-          </p:spPr>
-          <p:txBody>
-            <a:bodyPr wrap="none" rtlCol="0">
-              <a:noAutofit/>
-            </a:bodyPr>
-            <a:lstStyle/>
-            <a:p>
-              <a:pPr algn="ctr"/>
-              <a:r>
-                <a:rPr lang="en-US" sz="1100" dirty="0"/>
-                <a:t>Spectrum</a:t>
-              </a:r>
-            </a:p>
-          </p:txBody>
-        </p:sp>
-        <p:sp>
-          <p:nvSpPr>
-            <p:cNvPr id="12" name="TextBox 11">
-              <a:extLst>
-                <a:ext uri="{FF2B5EF4-FFF2-40B4-BE49-F238E27FC236}">
-                  <a16:creationId xmlns:a16="http://schemas.microsoft.com/office/drawing/2014/main" id="{DC1B063E-0ADB-FE57-ACEB-A4C5BA8BA2DB}"/>
-                </a:ext>
-              </a:extLst>
-            </p:cNvPr>
-            <p:cNvSpPr txBox="1"/>
-            <p:nvPr/>
-          </p:nvSpPr>
-          <p:spPr>
-            <a:xfrm>
-              <a:off x="434457" y="1253568"/>
-              <a:ext cx="1005840" cy="270843"/>
-            </a:xfrm>
-            <a:prstGeom prst="rect">
-              <a:avLst/>
-            </a:prstGeom>
-            <a:noFill/>
-            <a:ln>
-              <a:solidFill>
-                <a:schemeClr val="bg1">
-                  <a:lumMod val="50000"/>
-                </a:schemeClr>
-              </a:solidFill>
-            </a:ln>
-          </p:spPr>
-          <p:txBody>
-            <a:bodyPr wrap="none" rtlCol="0">
-              <a:noAutofit/>
-            </a:bodyPr>
-            <a:lstStyle/>
-            <a:p>
-              <a:pPr algn="ctr"/>
-              <a:r>
-                <a:rPr lang="en-US" sz="1100" dirty="0"/>
-                <a:t>Array of Spectra</a:t>
-              </a:r>
-            </a:p>
-          </p:txBody>
-        </p:sp>
-        <p:sp>
-          <p:nvSpPr>
-            <p:cNvPr id="13" name="TextBox 12">
-              <a:extLst>
-                <a:ext uri="{FF2B5EF4-FFF2-40B4-BE49-F238E27FC236}">
-                  <a16:creationId xmlns:a16="http://schemas.microsoft.com/office/drawing/2014/main" id="{2DCBAD96-EBB6-ADF6-45D8-77156AEF3427}"/>
-                </a:ext>
-              </a:extLst>
-            </p:cNvPr>
-            <p:cNvSpPr txBox="1"/>
-            <p:nvPr/>
-          </p:nvSpPr>
-          <p:spPr>
-            <a:xfrm>
-              <a:off x="1603111" y="1640543"/>
-              <a:ext cx="1058336" cy="270843"/>
-            </a:xfrm>
-            <a:prstGeom prst="rect">
-              <a:avLst/>
-            </a:prstGeom>
-            <a:noFill/>
-          </p:spPr>
-          <p:txBody>
-            <a:bodyPr wrap="none" rtlCol="0">
-              <a:noAutofit/>
-            </a:bodyPr>
-            <a:lstStyle/>
-            <a:p>
-              <a:pPr algn="ctr"/>
-              <a:r>
-                <a:rPr lang="en-US" sz="1100" dirty="0"/>
-                <a:t>Peak detection</a:t>
-              </a:r>
-            </a:p>
-          </p:txBody>
-        </p:sp>
-        <p:sp>
-          <p:nvSpPr>
-            <p:cNvPr id="14" name="TextBox 13">
-              <a:extLst>
-                <a:ext uri="{FF2B5EF4-FFF2-40B4-BE49-F238E27FC236}">
-                  <a16:creationId xmlns:a16="http://schemas.microsoft.com/office/drawing/2014/main" id="{AB84E2A3-8B1D-AB25-5674-7BC68C6DA2D4}"/>
-                </a:ext>
-              </a:extLst>
-            </p:cNvPr>
-            <p:cNvSpPr txBox="1"/>
-            <p:nvPr/>
-          </p:nvSpPr>
-          <p:spPr>
-            <a:xfrm>
-              <a:off x="6197565" y="1942304"/>
-              <a:ext cx="779733" cy="440121"/>
-            </a:xfrm>
-            <a:prstGeom prst="rect">
-              <a:avLst/>
-            </a:prstGeom>
-            <a:noFill/>
-            <a:ln w="6350">
-              <a:solidFill>
-                <a:schemeClr val="tx1"/>
-              </a:solidFill>
-            </a:ln>
-          </p:spPr>
-          <p:txBody>
-            <a:bodyPr wrap="none" rtlCol="0">
-              <a:noAutofit/>
-            </a:bodyPr>
-            <a:lstStyle/>
-            <a:p>
-              <a:pPr algn="ctr"/>
-              <a:r>
-                <a:rPr lang="en-US" sz="1100"/>
-                <a:t>Metabolic</a:t>
-              </a:r>
-              <a:br>
-                <a:rPr lang="en-US" sz="1100"/>
-              </a:br>
-              <a:r>
-                <a:rPr lang="en-US" sz="1100"/>
-                <a:t>Network</a:t>
-              </a:r>
-              <a:endParaRPr lang="en-US" sz="1100" dirty="0"/>
-            </a:p>
-          </p:txBody>
-        </p:sp>
-        <p:sp>
-          <p:nvSpPr>
-            <p:cNvPr id="15" name="TextBox 14">
-              <a:extLst>
-                <a:ext uri="{FF2B5EF4-FFF2-40B4-BE49-F238E27FC236}">
-                  <a16:creationId xmlns:a16="http://schemas.microsoft.com/office/drawing/2014/main" id="{79543F00-4F78-59AA-9FBD-73A17C43EEDC}"/>
-                </a:ext>
-              </a:extLst>
-            </p:cNvPr>
-            <p:cNvSpPr txBox="1"/>
-            <p:nvPr/>
-          </p:nvSpPr>
-          <p:spPr>
-            <a:xfrm>
-              <a:off x="4987745" y="1253568"/>
-              <a:ext cx="804672" cy="270843"/>
-            </a:xfrm>
-            <a:prstGeom prst="rect">
-              <a:avLst/>
-            </a:prstGeom>
-            <a:noFill/>
-            <a:ln w="6350">
-              <a:solidFill>
-                <a:schemeClr val="tx1"/>
-              </a:solidFill>
-            </a:ln>
-          </p:spPr>
-          <p:txBody>
-            <a:bodyPr wrap="none" rtlCol="0">
-              <a:noAutofit/>
-            </a:bodyPr>
-            <a:lstStyle/>
-            <a:p>
-              <a:pPr algn="ctr"/>
-              <a:r>
-                <a:rPr lang="en-US" sz="1100" dirty="0"/>
-                <a:t>Pathway</a:t>
-              </a:r>
-            </a:p>
-          </p:txBody>
-        </p:sp>
-        <p:sp>
-          <p:nvSpPr>
-            <p:cNvPr id="16" name="TextBox 15">
-              <a:extLst>
-                <a:ext uri="{FF2B5EF4-FFF2-40B4-BE49-F238E27FC236}">
-                  <a16:creationId xmlns:a16="http://schemas.microsoft.com/office/drawing/2014/main" id="{F26A2369-AA92-02D0-B71C-E1B3140161A3}"/>
-                </a:ext>
-              </a:extLst>
-            </p:cNvPr>
-            <p:cNvSpPr txBox="1"/>
-            <p:nvPr/>
-          </p:nvSpPr>
-          <p:spPr>
-            <a:xfrm>
-              <a:off x="4987745" y="2026943"/>
-              <a:ext cx="804672" cy="270843"/>
-            </a:xfrm>
-            <a:prstGeom prst="rect">
-              <a:avLst/>
-            </a:prstGeom>
-            <a:noFill/>
-            <a:ln w="6350">
-              <a:solidFill>
-                <a:schemeClr val="tx1"/>
-              </a:solidFill>
-            </a:ln>
-          </p:spPr>
-          <p:txBody>
-            <a:bodyPr wrap="none" rtlCol="0">
-              <a:noAutofit/>
-            </a:bodyPr>
-            <a:lstStyle/>
-            <a:p>
-              <a:pPr algn="ctr"/>
-              <a:r>
-                <a:rPr lang="en-US" sz="1100"/>
-                <a:t>Reaction</a:t>
-              </a:r>
-              <a:endParaRPr lang="en-US" sz="1100" dirty="0"/>
-            </a:p>
-          </p:txBody>
-        </p:sp>
-        <p:sp>
-          <p:nvSpPr>
-            <p:cNvPr id="17" name="TextBox 16">
-              <a:extLst>
-                <a:ext uri="{FF2B5EF4-FFF2-40B4-BE49-F238E27FC236}">
-                  <a16:creationId xmlns:a16="http://schemas.microsoft.com/office/drawing/2014/main" id="{6A3D1B8F-3AE2-8D72-571E-CFE159EDA0D2}"/>
-                </a:ext>
-              </a:extLst>
-            </p:cNvPr>
-            <p:cNvSpPr txBox="1"/>
-            <p:nvPr/>
-          </p:nvSpPr>
-          <p:spPr>
-            <a:xfrm>
-              <a:off x="3795526" y="2026943"/>
-              <a:ext cx="804672" cy="270843"/>
-            </a:xfrm>
-            <a:prstGeom prst="rect">
-              <a:avLst/>
-            </a:prstGeom>
-            <a:noFill/>
-            <a:ln w="6350">
-              <a:solidFill>
-                <a:schemeClr val="tx1"/>
-              </a:solidFill>
-            </a:ln>
-          </p:spPr>
-          <p:txBody>
-            <a:bodyPr wrap="none" rtlCol="0">
-              <a:noAutofit/>
-            </a:bodyPr>
-            <a:lstStyle/>
-            <a:p>
-              <a:pPr algn="ctr"/>
-              <a:r>
-                <a:rPr lang="en-US" sz="1100" dirty="0"/>
-                <a:t>Enzyme</a:t>
-              </a:r>
-            </a:p>
-          </p:txBody>
-        </p:sp>
-        <p:sp>
-          <p:nvSpPr>
-            <p:cNvPr id="18" name="TextBox 17">
-              <a:extLst>
-                <a:ext uri="{FF2B5EF4-FFF2-40B4-BE49-F238E27FC236}">
-                  <a16:creationId xmlns:a16="http://schemas.microsoft.com/office/drawing/2014/main" id="{729096EA-CD35-3A6B-08E6-7CECF0181725}"/>
-                </a:ext>
-              </a:extLst>
-            </p:cNvPr>
-            <p:cNvSpPr txBox="1"/>
-            <p:nvPr/>
-          </p:nvSpPr>
-          <p:spPr>
-            <a:xfrm>
-              <a:off x="3795526" y="1253568"/>
-              <a:ext cx="804672" cy="270843"/>
-            </a:xfrm>
-            <a:prstGeom prst="rect">
-              <a:avLst/>
-            </a:prstGeom>
-            <a:noFill/>
-            <a:ln w="6350">
-              <a:solidFill>
-                <a:schemeClr val="tx1"/>
-              </a:solidFill>
-            </a:ln>
-          </p:spPr>
-          <p:txBody>
-            <a:bodyPr wrap="none" rtlCol="0">
-              <a:noAutofit/>
-            </a:bodyPr>
-            <a:lstStyle/>
-            <a:p>
-              <a:pPr algn="ctr"/>
-              <a:r>
-                <a:rPr lang="en-US" sz="1100" dirty="0"/>
-                <a:t>Gene</a:t>
-              </a:r>
-            </a:p>
-          </p:txBody>
-        </p:sp>
-        <p:sp>
-          <p:nvSpPr>
-            <p:cNvPr id="19" name="TextBox 18">
-              <a:extLst>
-                <a:ext uri="{FF2B5EF4-FFF2-40B4-BE49-F238E27FC236}">
-                  <a16:creationId xmlns:a16="http://schemas.microsoft.com/office/drawing/2014/main" id="{2529FADF-7268-35D3-C5F8-0D1E6EA3C592}"/>
-                </a:ext>
-              </a:extLst>
-            </p:cNvPr>
-            <p:cNvSpPr txBox="1"/>
-            <p:nvPr/>
-          </p:nvSpPr>
-          <p:spPr>
-            <a:xfrm>
-              <a:off x="4887161" y="2733410"/>
-              <a:ext cx="1005840" cy="438912"/>
-            </a:xfrm>
-            <a:prstGeom prst="rect">
-              <a:avLst/>
-            </a:prstGeom>
-            <a:noFill/>
-            <a:ln>
-              <a:solidFill>
-                <a:schemeClr val="bg1">
-                  <a:lumMod val="50000"/>
-                </a:schemeClr>
-              </a:solidFill>
-            </a:ln>
-          </p:spPr>
-          <p:txBody>
-            <a:bodyPr wrap="none" rtlCol="0">
-              <a:noAutofit/>
-            </a:bodyPr>
-            <a:lstStyle/>
-            <a:p>
-              <a:pPr algn="ctr"/>
-              <a:r>
-                <a:rPr lang="en-US" sz="1100" dirty="0"/>
-                <a:t>Compound</a:t>
-              </a:r>
-            </a:p>
-            <a:p>
-              <a:pPr algn="ctr"/>
-              <a:r>
-                <a:rPr lang="en-US" sz="1100" dirty="0"/>
-                <a:t>(Metabolite)</a:t>
-              </a:r>
-            </a:p>
-          </p:txBody>
-        </p:sp>
-        <p:cxnSp>
-          <p:nvCxnSpPr>
-            <p:cNvPr id="20" name="Elbow Connector 19">
-              <a:extLst>
-                <a:ext uri="{FF2B5EF4-FFF2-40B4-BE49-F238E27FC236}">
-                  <a16:creationId xmlns:a16="http://schemas.microsoft.com/office/drawing/2014/main" id="{090B8867-F728-4BA5-D3AF-7E6A4E14CFF3}"/>
-                </a:ext>
-              </a:extLst>
-            </p:cNvPr>
-            <p:cNvCxnSpPr>
-              <a:stCxn id="12" idx="2"/>
-              <a:endCxn id="8" idx="1"/>
-            </p:cNvCxnSpPr>
-            <p:nvPr/>
-          </p:nvCxnSpPr>
-          <p:spPr>
-            <a:xfrm rot="16200000" flipH="1">
-              <a:off x="835941" y="1625847"/>
-              <a:ext cx="1424022" cy="1221150"/>
-            </a:xfrm>
-            <a:prstGeom prst="bentConnector2">
-              <a:avLst/>
-            </a:prstGeom>
-            <a:ln>
-              <a:prstDash val="dash"/>
-              <a:tailEnd type="triangle"/>
-            </a:ln>
-          </p:spPr>
-          <p:style>
-            <a:lnRef idx="1">
-              <a:schemeClr val="accent1"/>
-            </a:lnRef>
-            <a:fillRef idx="0">
-              <a:schemeClr val="accent1"/>
-            </a:fillRef>
-            <a:effectRef idx="0">
-              <a:schemeClr val="accent1"/>
-            </a:effectRef>
-            <a:fontRef idx="minor">
+            <a:ext cx="1005840" cy="270843"/>
+          </a:xfrm>
+          <a:prstGeom prst="rect">
+            <a:avLst/>
+          </a:prstGeom>
+          <a:noFill/>
+          <a:ln>
+            <a:solidFill>
+              <a:schemeClr val="bg1">
+                <a:lumMod val="50000"/>
+              </a:schemeClr>
+            </a:solidFill>
+          </a:ln>
+        </p:spPr>
+        <p:txBody>
+          <a:bodyPr wrap="none" rtlCol="0">
+            <a:noAutofit/>
+          </a:bodyPr>
+          <a:lstStyle/>
+          <a:p>
+            <a:pPr algn="ctr"/>
+            <a:r>
+              <a:rPr lang="en-US" sz="1100" dirty="0"/>
+              <a:t>Spectrum</a:t>
+            </a:r>
+          </a:p>
+        </p:txBody>
+      </p:sp>
+      <p:sp>
+        <p:nvSpPr>
+          <p:cNvPr id="12" name="TextBox 11">
+            <a:extLst>
+              <a:ext uri="{FF2B5EF4-FFF2-40B4-BE49-F238E27FC236}">
+                <a16:creationId xmlns:a16="http://schemas.microsoft.com/office/drawing/2014/main" id="{DC1B063E-0ADB-FE57-ACEB-A4C5BA8BA2DB}"/>
+              </a:ext>
+            </a:extLst>
+          </p:cNvPr>
+          <p:cNvSpPr txBox="1"/>
+          <p:nvPr/>
+        </p:nvSpPr>
+        <p:spPr>
+          <a:xfrm>
+            <a:off x="2197156" y="2281662"/>
+            <a:ext cx="1005840" cy="270843"/>
+          </a:xfrm>
+          <a:prstGeom prst="rect">
+            <a:avLst/>
+          </a:prstGeom>
+          <a:noFill/>
+          <a:ln>
+            <a:solidFill>
+              <a:schemeClr val="bg1">
+                <a:lumMod val="50000"/>
+              </a:schemeClr>
+            </a:solidFill>
+          </a:ln>
+        </p:spPr>
+        <p:txBody>
+          <a:bodyPr wrap="none" rtlCol="0">
+            <a:noAutofit/>
+          </a:bodyPr>
+          <a:lstStyle/>
+          <a:p>
+            <a:pPr algn="ctr"/>
+            <a:r>
+              <a:rPr lang="en-US" sz="1100" dirty="0"/>
+              <a:t>Array of Spectra</a:t>
+            </a:r>
+          </a:p>
+        </p:txBody>
+      </p:sp>
+      <p:sp>
+        <p:nvSpPr>
+          <p:cNvPr id="13" name="TextBox 12">
+            <a:extLst>
+              <a:ext uri="{FF2B5EF4-FFF2-40B4-BE49-F238E27FC236}">
+                <a16:creationId xmlns:a16="http://schemas.microsoft.com/office/drawing/2014/main" id="{2DCBAD96-EBB6-ADF6-45D8-77156AEF3427}"/>
+              </a:ext>
+            </a:extLst>
+          </p:cNvPr>
+          <p:cNvSpPr txBox="1"/>
+          <p:nvPr/>
+        </p:nvSpPr>
+        <p:spPr>
+          <a:xfrm>
+            <a:off x="3365810" y="2668637"/>
+            <a:ext cx="1058336" cy="270843"/>
+          </a:xfrm>
+          <a:prstGeom prst="rect">
+            <a:avLst/>
+          </a:prstGeom>
+          <a:noFill/>
+        </p:spPr>
+        <p:txBody>
+          <a:bodyPr wrap="none" rtlCol="0">
+            <a:noAutofit/>
+          </a:bodyPr>
+          <a:lstStyle/>
+          <a:p>
+            <a:pPr algn="ctr"/>
+            <a:r>
+              <a:rPr lang="en-US" sz="1100" dirty="0"/>
+              <a:t>Peak detection</a:t>
+            </a:r>
+          </a:p>
+        </p:txBody>
+      </p:sp>
+      <p:sp>
+        <p:nvSpPr>
+          <p:cNvPr id="14" name="TextBox 13">
+            <a:extLst>
+              <a:ext uri="{FF2B5EF4-FFF2-40B4-BE49-F238E27FC236}">
+                <a16:creationId xmlns:a16="http://schemas.microsoft.com/office/drawing/2014/main" id="{AB84E2A3-8B1D-AB25-5674-7BC68C6DA2D4}"/>
+              </a:ext>
+            </a:extLst>
+          </p:cNvPr>
+          <p:cNvSpPr txBox="1"/>
+          <p:nvPr/>
+        </p:nvSpPr>
+        <p:spPr>
+          <a:xfrm>
+            <a:off x="7960264" y="2970398"/>
+            <a:ext cx="779733" cy="440121"/>
+          </a:xfrm>
+          <a:prstGeom prst="rect">
+            <a:avLst/>
+          </a:prstGeom>
+          <a:noFill/>
+          <a:ln w="6350">
+            <a:solidFill>
               <a:schemeClr val="tx1"/>
-            </a:fontRef>
-          </p:style>
-        </p:cxnSp>
-        <p:cxnSp>
-          <p:nvCxnSpPr>
-            <p:cNvPr id="21" name="Straight Arrow Connector 20">
-              <a:extLst>
-                <a:ext uri="{FF2B5EF4-FFF2-40B4-BE49-F238E27FC236}">
-                  <a16:creationId xmlns:a16="http://schemas.microsoft.com/office/drawing/2014/main" id="{3B5BD2A7-5766-510D-0EEE-15948FB28549}"/>
-                </a:ext>
-              </a:extLst>
-            </p:cNvPr>
-            <p:cNvCxnSpPr>
-              <a:cxnSpLocks/>
-              <a:stCxn id="8" idx="3"/>
-              <a:endCxn id="19" idx="1"/>
-            </p:cNvCxnSpPr>
-            <p:nvPr/>
-          </p:nvCxnSpPr>
-          <p:spPr>
-            <a:xfrm>
-              <a:off x="3164367" y="2948433"/>
-              <a:ext cx="1722794" cy="4433"/>
-            </a:xfrm>
-            <a:prstGeom prst="straightConnector1">
-              <a:avLst/>
-            </a:prstGeom>
-            <a:ln>
-              <a:prstDash val="dash"/>
-              <a:tailEnd type="triangle"/>
-            </a:ln>
-          </p:spPr>
-          <p:style>
-            <a:lnRef idx="1">
-              <a:schemeClr val="accent1"/>
-            </a:lnRef>
-            <a:fillRef idx="0">
-              <a:schemeClr val="accent1"/>
-            </a:fillRef>
-            <a:effectRef idx="0">
-              <a:schemeClr val="accent1"/>
-            </a:effectRef>
-            <a:fontRef idx="minor">
+            </a:solidFill>
+          </a:ln>
+        </p:spPr>
+        <p:txBody>
+          <a:bodyPr wrap="none" rtlCol="0">
+            <a:noAutofit/>
+          </a:bodyPr>
+          <a:lstStyle/>
+          <a:p>
+            <a:pPr algn="ctr"/>
+            <a:r>
+              <a:rPr lang="en-US" sz="1100"/>
+              <a:t>Metabolic</a:t>
+            </a:r>
+            <a:br>
+              <a:rPr lang="en-US" sz="1100"/>
+            </a:br>
+            <a:r>
+              <a:rPr lang="en-US" sz="1100"/>
+              <a:t>Network</a:t>
+            </a:r>
+            <a:endParaRPr lang="en-US" sz="1100" dirty="0"/>
+          </a:p>
+        </p:txBody>
+      </p:sp>
+      <p:sp>
+        <p:nvSpPr>
+          <p:cNvPr id="15" name="TextBox 14">
+            <a:extLst>
+              <a:ext uri="{FF2B5EF4-FFF2-40B4-BE49-F238E27FC236}">
+                <a16:creationId xmlns:a16="http://schemas.microsoft.com/office/drawing/2014/main" id="{79543F00-4F78-59AA-9FBD-73A17C43EEDC}"/>
+              </a:ext>
+            </a:extLst>
+          </p:cNvPr>
+          <p:cNvSpPr txBox="1"/>
+          <p:nvPr/>
+        </p:nvSpPr>
+        <p:spPr>
+          <a:xfrm>
+            <a:off x="6750444" y="2281662"/>
+            <a:ext cx="804672" cy="270843"/>
+          </a:xfrm>
+          <a:prstGeom prst="rect">
+            <a:avLst/>
+          </a:prstGeom>
+          <a:noFill/>
+          <a:ln w="6350">
+            <a:solidFill>
               <a:schemeClr val="tx1"/>
-            </a:fontRef>
-          </p:style>
-        </p:cxnSp>
-        <p:cxnSp>
-          <p:nvCxnSpPr>
-            <p:cNvPr id="22" name="Straight Arrow Connector 21">
-              <a:extLst>
-                <a:ext uri="{FF2B5EF4-FFF2-40B4-BE49-F238E27FC236}">
-                  <a16:creationId xmlns:a16="http://schemas.microsoft.com/office/drawing/2014/main" id="{5065F5F1-DC40-50D5-D64F-4477A776CB50}"/>
-                </a:ext>
-              </a:extLst>
-            </p:cNvPr>
-            <p:cNvCxnSpPr>
-              <a:stCxn id="11" idx="2"/>
-              <a:endCxn id="12" idx="0"/>
-            </p:cNvCxnSpPr>
-            <p:nvPr/>
-          </p:nvCxnSpPr>
-          <p:spPr>
-            <a:xfrm>
-              <a:off x="937377" y="647419"/>
-              <a:ext cx="0" cy="606149"/>
-            </a:xfrm>
-            <a:prstGeom prst="straightConnector1">
-              <a:avLst/>
-            </a:prstGeom>
-            <a:ln>
-              <a:tailEnd type="triangle"/>
-            </a:ln>
-          </p:spPr>
-          <p:style>
-            <a:lnRef idx="1">
-              <a:schemeClr val="accent1"/>
-            </a:lnRef>
-            <a:fillRef idx="0">
-              <a:schemeClr val="accent1"/>
-            </a:fillRef>
-            <a:effectRef idx="0">
-              <a:schemeClr val="accent1"/>
-            </a:effectRef>
-            <a:fontRef idx="minor">
+            </a:solidFill>
+          </a:ln>
+        </p:spPr>
+        <p:txBody>
+          <a:bodyPr wrap="none" rtlCol="0">
+            <a:noAutofit/>
+          </a:bodyPr>
+          <a:lstStyle/>
+          <a:p>
+            <a:pPr algn="ctr"/>
+            <a:r>
+              <a:rPr lang="en-US" sz="1100" dirty="0"/>
+              <a:t>Pathway</a:t>
+            </a:r>
+          </a:p>
+        </p:txBody>
+      </p:sp>
+      <p:sp>
+        <p:nvSpPr>
+          <p:cNvPr id="16" name="TextBox 15">
+            <a:extLst>
+              <a:ext uri="{FF2B5EF4-FFF2-40B4-BE49-F238E27FC236}">
+                <a16:creationId xmlns:a16="http://schemas.microsoft.com/office/drawing/2014/main" id="{F26A2369-AA92-02D0-B71C-E1B3140161A3}"/>
+              </a:ext>
+            </a:extLst>
+          </p:cNvPr>
+          <p:cNvSpPr txBox="1"/>
+          <p:nvPr/>
+        </p:nvSpPr>
+        <p:spPr>
+          <a:xfrm>
+            <a:off x="6750444" y="3055037"/>
+            <a:ext cx="804672" cy="270843"/>
+          </a:xfrm>
+          <a:prstGeom prst="rect">
+            <a:avLst/>
+          </a:prstGeom>
+          <a:noFill/>
+          <a:ln w="6350">
+            <a:solidFill>
               <a:schemeClr val="tx1"/>
-            </a:fontRef>
-          </p:style>
-        </p:cxnSp>
-        <p:cxnSp>
-          <p:nvCxnSpPr>
-            <p:cNvPr id="23" name="Straight Arrow Connector 22">
-              <a:extLst>
-                <a:ext uri="{FF2B5EF4-FFF2-40B4-BE49-F238E27FC236}">
-                  <a16:creationId xmlns:a16="http://schemas.microsoft.com/office/drawing/2014/main" id="{A98CFF50-0CC9-A788-2CB0-4E3AE00B1C95}"/>
-                </a:ext>
-              </a:extLst>
-            </p:cNvPr>
-            <p:cNvCxnSpPr>
-              <a:stCxn id="12" idx="3"/>
-              <a:endCxn id="9" idx="1"/>
-            </p:cNvCxnSpPr>
-            <p:nvPr/>
-          </p:nvCxnSpPr>
-          <p:spPr>
-            <a:xfrm>
-              <a:off x="1440297" y="1388990"/>
-              <a:ext cx="718230" cy="0"/>
-            </a:xfrm>
-            <a:prstGeom prst="straightConnector1">
-              <a:avLst/>
-            </a:prstGeom>
-            <a:ln>
-              <a:tailEnd type="triangle"/>
-            </a:ln>
-          </p:spPr>
-          <p:style>
-            <a:lnRef idx="1">
-              <a:schemeClr val="accent1"/>
-            </a:lnRef>
-            <a:fillRef idx="0">
-              <a:schemeClr val="accent1"/>
-            </a:fillRef>
-            <a:effectRef idx="0">
-              <a:schemeClr val="accent1"/>
-            </a:effectRef>
-            <a:fontRef idx="minor">
+            </a:solidFill>
+          </a:ln>
+        </p:spPr>
+        <p:txBody>
+          <a:bodyPr wrap="none" rtlCol="0">
+            <a:noAutofit/>
+          </a:bodyPr>
+          <a:lstStyle/>
+          <a:p>
+            <a:pPr algn="ctr"/>
+            <a:r>
+              <a:rPr lang="en-US" sz="1100"/>
+              <a:t>Reaction</a:t>
+            </a:r>
+            <a:endParaRPr lang="en-US" sz="1100" dirty="0"/>
+          </a:p>
+        </p:txBody>
+      </p:sp>
+      <p:sp>
+        <p:nvSpPr>
+          <p:cNvPr id="17" name="TextBox 16">
+            <a:extLst>
+              <a:ext uri="{FF2B5EF4-FFF2-40B4-BE49-F238E27FC236}">
+                <a16:creationId xmlns:a16="http://schemas.microsoft.com/office/drawing/2014/main" id="{6A3D1B8F-3AE2-8D72-571E-CFE159EDA0D2}"/>
+              </a:ext>
+            </a:extLst>
+          </p:cNvPr>
+          <p:cNvSpPr txBox="1"/>
+          <p:nvPr/>
+        </p:nvSpPr>
+        <p:spPr>
+          <a:xfrm>
+            <a:off x="5558225" y="3055037"/>
+            <a:ext cx="804672" cy="270843"/>
+          </a:xfrm>
+          <a:prstGeom prst="rect">
+            <a:avLst/>
+          </a:prstGeom>
+          <a:noFill/>
+          <a:ln w="6350">
+            <a:solidFill>
               <a:schemeClr val="tx1"/>
-            </a:fontRef>
-          </p:style>
-        </p:cxnSp>
-        <p:cxnSp>
-          <p:nvCxnSpPr>
-            <p:cNvPr id="24" name="Straight Arrow Connector 23">
-              <a:extLst>
-                <a:ext uri="{FF2B5EF4-FFF2-40B4-BE49-F238E27FC236}">
-                  <a16:creationId xmlns:a16="http://schemas.microsoft.com/office/drawing/2014/main" id="{EC136F5C-C9E9-FE29-FB29-DF41EDFA14DE}"/>
-                </a:ext>
-              </a:extLst>
-            </p:cNvPr>
-            <p:cNvCxnSpPr>
-              <a:cxnSpLocks/>
-              <a:stCxn id="8" idx="2"/>
-              <a:endCxn id="6" idx="0"/>
-            </p:cNvCxnSpPr>
-            <p:nvPr/>
-          </p:nvCxnSpPr>
-          <p:spPr>
-            <a:xfrm>
-              <a:off x="2661447" y="3083854"/>
-              <a:ext cx="0" cy="474724"/>
-            </a:xfrm>
-            <a:prstGeom prst="straightConnector1">
-              <a:avLst/>
-            </a:prstGeom>
-            <a:ln>
-              <a:tailEnd type="triangle"/>
-            </a:ln>
-          </p:spPr>
-          <p:style>
-            <a:lnRef idx="1">
-              <a:schemeClr val="accent1"/>
-            </a:lnRef>
-            <a:fillRef idx="0">
-              <a:schemeClr val="accent1"/>
-            </a:fillRef>
-            <a:effectRef idx="0">
-              <a:schemeClr val="accent1"/>
-            </a:effectRef>
-            <a:fontRef idx="minor">
+            </a:solidFill>
+          </a:ln>
+        </p:spPr>
+        <p:txBody>
+          <a:bodyPr wrap="none" rtlCol="0">
+            <a:noAutofit/>
+          </a:bodyPr>
+          <a:lstStyle/>
+          <a:p>
+            <a:pPr algn="ctr"/>
+            <a:r>
+              <a:rPr lang="en-US" sz="1100" dirty="0"/>
+              <a:t>Enzyme</a:t>
+            </a:r>
+          </a:p>
+        </p:txBody>
+      </p:sp>
+      <p:sp>
+        <p:nvSpPr>
+          <p:cNvPr id="18" name="TextBox 17">
+            <a:extLst>
+              <a:ext uri="{FF2B5EF4-FFF2-40B4-BE49-F238E27FC236}">
+                <a16:creationId xmlns:a16="http://schemas.microsoft.com/office/drawing/2014/main" id="{729096EA-CD35-3A6B-08E6-7CECF0181725}"/>
+              </a:ext>
+            </a:extLst>
+          </p:cNvPr>
+          <p:cNvSpPr txBox="1"/>
+          <p:nvPr/>
+        </p:nvSpPr>
+        <p:spPr>
+          <a:xfrm>
+            <a:off x="5558225" y="2281662"/>
+            <a:ext cx="804672" cy="270843"/>
+          </a:xfrm>
+          <a:prstGeom prst="rect">
+            <a:avLst/>
+          </a:prstGeom>
+          <a:noFill/>
+          <a:ln w="6350">
+            <a:solidFill>
               <a:schemeClr val="tx1"/>
-            </a:fontRef>
-          </p:style>
-        </p:cxnSp>
-        <p:cxnSp>
-          <p:nvCxnSpPr>
-            <p:cNvPr id="25" name="Elbow Connector 24">
-              <a:extLst>
-                <a:ext uri="{FF2B5EF4-FFF2-40B4-BE49-F238E27FC236}">
-                  <a16:creationId xmlns:a16="http://schemas.microsoft.com/office/drawing/2014/main" id="{EBCDC23A-850A-11F8-345A-CD67406C30D6}"/>
-                </a:ext>
-              </a:extLst>
-            </p:cNvPr>
-            <p:cNvCxnSpPr>
-              <a:cxnSpLocks/>
-              <a:stCxn id="6" idx="3"/>
-              <a:endCxn id="19" idx="2"/>
-            </p:cNvCxnSpPr>
-            <p:nvPr/>
-          </p:nvCxnSpPr>
-          <p:spPr>
-            <a:xfrm flipV="1">
-              <a:off x="3164367" y="3172322"/>
-              <a:ext cx="2225714" cy="606317"/>
-            </a:xfrm>
-            <a:prstGeom prst="bentConnector2">
-              <a:avLst/>
-            </a:prstGeom>
-            <a:ln>
-              <a:tailEnd type="triangle"/>
-            </a:ln>
-          </p:spPr>
-          <p:style>
-            <a:lnRef idx="1">
-              <a:schemeClr val="accent1"/>
-            </a:lnRef>
-            <a:fillRef idx="0">
-              <a:schemeClr val="accent1"/>
-            </a:fillRef>
-            <a:effectRef idx="0">
-              <a:schemeClr val="accent1"/>
-            </a:effectRef>
-            <a:fontRef idx="minor">
-              <a:schemeClr val="tx1"/>
-            </a:fontRef>
-          </p:style>
-        </p:cxnSp>
-        <p:cxnSp>
-          <p:nvCxnSpPr>
-            <p:cNvPr id="26" name="Straight Arrow Connector 25">
-              <a:extLst>
-                <a:ext uri="{FF2B5EF4-FFF2-40B4-BE49-F238E27FC236}">
-                  <a16:creationId xmlns:a16="http://schemas.microsoft.com/office/drawing/2014/main" id="{24B3A8F0-CCCE-2E7C-B7FD-D876E65E5E78}"/>
-                </a:ext>
-              </a:extLst>
-            </p:cNvPr>
-            <p:cNvCxnSpPr>
-              <a:cxnSpLocks/>
-            </p:cNvCxnSpPr>
-            <p:nvPr/>
-          </p:nvCxnSpPr>
-          <p:spPr>
-            <a:xfrm>
-              <a:off x="4197862" y="1524411"/>
-              <a:ext cx="0" cy="502532"/>
-            </a:xfrm>
-            <a:prstGeom prst="straightConnector1">
-              <a:avLst/>
-            </a:prstGeom>
-            <a:ln>
-              <a:tailEnd type="triangle"/>
-            </a:ln>
-          </p:spPr>
-          <p:style>
-            <a:lnRef idx="1">
-              <a:schemeClr val="accent1"/>
-            </a:lnRef>
-            <a:fillRef idx="0">
-              <a:schemeClr val="accent1"/>
-            </a:fillRef>
-            <a:effectRef idx="0">
-              <a:schemeClr val="accent1"/>
-            </a:effectRef>
-            <a:fontRef idx="minor">
-              <a:schemeClr val="tx1"/>
-            </a:fontRef>
-          </p:style>
-        </p:cxnSp>
-        <p:cxnSp>
-          <p:nvCxnSpPr>
-            <p:cNvPr id="27" name="Straight Arrow Connector 26">
-              <a:extLst>
-                <a:ext uri="{FF2B5EF4-FFF2-40B4-BE49-F238E27FC236}">
-                  <a16:creationId xmlns:a16="http://schemas.microsoft.com/office/drawing/2014/main" id="{BABF3647-BFED-08A5-55D4-F41D837B7E80}"/>
-                </a:ext>
-              </a:extLst>
-            </p:cNvPr>
-            <p:cNvCxnSpPr>
-              <a:stCxn id="16" idx="0"/>
-              <a:endCxn id="15" idx="2"/>
-            </p:cNvCxnSpPr>
-            <p:nvPr/>
-          </p:nvCxnSpPr>
-          <p:spPr>
-            <a:xfrm flipV="1">
-              <a:off x="5390081" y="1524411"/>
-              <a:ext cx="0" cy="502532"/>
-            </a:xfrm>
-            <a:prstGeom prst="straightConnector1">
-              <a:avLst/>
-            </a:prstGeom>
-            <a:ln>
-              <a:tailEnd type="triangle"/>
-            </a:ln>
-          </p:spPr>
-          <p:style>
-            <a:lnRef idx="1">
-              <a:schemeClr val="accent1"/>
-            </a:lnRef>
-            <a:fillRef idx="0">
-              <a:schemeClr val="accent1"/>
-            </a:fillRef>
-            <a:effectRef idx="0">
-              <a:schemeClr val="accent1"/>
-            </a:effectRef>
-            <a:fontRef idx="minor">
-              <a:schemeClr val="tx1"/>
-            </a:fontRef>
-          </p:style>
-        </p:cxnSp>
-        <p:cxnSp>
-          <p:nvCxnSpPr>
-            <p:cNvPr id="28" name="Straight Arrow Connector 27">
-              <a:extLst>
-                <a:ext uri="{FF2B5EF4-FFF2-40B4-BE49-F238E27FC236}">
-                  <a16:creationId xmlns:a16="http://schemas.microsoft.com/office/drawing/2014/main" id="{F67F79DE-A841-EAE7-6679-45F52CA61A9E}"/>
-                </a:ext>
-              </a:extLst>
-            </p:cNvPr>
-            <p:cNvCxnSpPr>
-              <a:stCxn id="17" idx="3"/>
-              <a:endCxn id="16" idx="1"/>
-            </p:cNvCxnSpPr>
-            <p:nvPr/>
-          </p:nvCxnSpPr>
-          <p:spPr>
-            <a:xfrm>
-              <a:off x="4600198" y="2162365"/>
-              <a:ext cx="387547" cy="0"/>
-            </a:xfrm>
-            <a:prstGeom prst="straightConnector1">
-              <a:avLst/>
-            </a:prstGeom>
-            <a:ln>
-              <a:tailEnd type="triangle"/>
-            </a:ln>
-          </p:spPr>
-          <p:style>
-            <a:lnRef idx="1">
-              <a:schemeClr val="accent1"/>
-            </a:lnRef>
-            <a:fillRef idx="0">
-              <a:schemeClr val="accent1"/>
-            </a:fillRef>
-            <a:effectRef idx="0">
-              <a:schemeClr val="accent1"/>
-            </a:effectRef>
-            <a:fontRef idx="minor">
-              <a:schemeClr val="tx1"/>
-            </a:fontRef>
-          </p:style>
-        </p:cxnSp>
-        <p:cxnSp>
-          <p:nvCxnSpPr>
-            <p:cNvPr id="29" name="Straight Arrow Connector 28">
-              <a:extLst>
-                <a:ext uri="{FF2B5EF4-FFF2-40B4-BE49-F238E27FC236}">
-                  <a16:creationId xmlns:a16="http://schemas.microsoft.com/office/drawing/2014/main" id="{CE87DE2C-63EB-1264-6AF4-A0C9F164E522}"/>
-                </a:ext>
-              </a:extLst>
-            </p:cNvPr>
-            <p:cNvCxnSpPr>
-              <a:stCxn id="16" idx="3"/>
-              <a:endCxn id="14" idx="1"/>
-            </p:cNvCxnSpPr>
-            <p:nvPr/>
-          </p:nvCxnSpPr>
-          <p:spPr>
-            <a:xfrm>
-              <a:off x="5792417" y="2162365"/>
-              <a:ext cx="405148" cy="0"/>
-            </a:xfrm>
-            <a:prstGeom prst="straightConnector1">
-              <a:avLst/>
-            </a:prstGeom>
-            <a:ln>
-              <a:tailEnd type="triangle"/>
-            </a:ln>
-          </p:spPr>
-          <p:style>
-            <a:lnRef idx="1">
-              <a:schemeClr val="accent1"/>
-            </a:lnRef>
-            <a:fillRef idx="0">
-              <a:schemeClr val="accent1"/>
-            </a:fillRef>
-            <a:effectRef idx="0">
-              <a:schemeClr val="accent1"/>
-            </a:effectRef>
-            <a:fontRef idx="minor">
-              <a:schemeClr val="tx1"/>
-            </a:fontRef>
-          </p:style>
-        </p:cxnSp>
-        <p:cxnSp>
-          <p:nvCxnSpPr>
-            <p:cNvPr id="30" name="Straight Arrow Connector 29">
-              <a:extLst>
-                <a:ext uri="{FF2B5EF4-FFF2-40B4-BE49-F238E27FC236}">
-                  <a16:creationId xmlns:a16="http://schemas.microsoft.com/office/drawing/2014/main" id="{5FE6753F-E9F4-31AE-B3EB-6A70BD4D259C}"/>
-                </a:ext>
-              </a:extLst>
-            </p:cNvPr>
-            <p:cNvCxnSpPr>
-              <a:cxnSpLocks/>
-              <a:stCxn id="19" idx="0"/>
-              <a:endCxn id="16" idx="2"/>
-            </p:cNvCxnSpPr>
-            <p:nvPr/>
-          </p:nvCxnSpPr>
-          <p:spPr>
-            <a:xfrm flipV="1">
-              <a:off x="5390081" y="2297786"/>
-              <a:ext cx="0" cy="435624"/>
-            </a:xfrm>
-            <a:prstGeom prst="straightConnector1">
-              <a:avLst/>
-            </a:prstGeom>
-            <a:ln>
-              <a:tailEnd type="triangle"/>
-            </a:ln>
-          </p:spPr>
-          <p:style>
-            <a:lnRef idx="1">
-              <a:schemeClr val="accent1"/>
-            </a:lnRef>
-            <a:fillRef idx="0">
-              <a:schemeClr val="accent1"/>
-            </a:fillRef>
-            <a:effectRef idx="0">
-              <a:schemeClr val="accent1"/>
-            </a:effectRef>
-            <a:fontRef idx="minor">
-              <a:schemeClr val="tx1"/>
-            </a:fontRef>
-          </p:style>
-        </p:cxnSp>
-        <p:cxnSp>
-          <p:nvCxnSpPr>
-            <p:cNvPr id="31" name="Straight Arrow Connector 30">
-              <a:extLst>
-                <a:ext uri="{FF2B5EF4-FFF2-40B4-BE49-F238E27FC236}">
-                  <a16:creationId xmlns:a16="http://schemas.microsoft.com/office/drawing/2014/main" id="{978DECFF-B467-7A95-610B-86E8A9E252DB}"/>
-                </a:ext>
-              </a:extLst>
-            </p:cNvPr>
-            <p:cNvCxnSpPr>
-              <a:stCxn id="7" idx="2"/>
-              <a:endCxn id="8" idx="0"/>
-            </p:cNvCxnSpPr>
-            <p:nvPr/>
-          </p:nvCxnSpPr>
-          <p:spPr>
-            <a:xfrm>
-              <a:off x="2661447" y="2297786"/>
-              <a:ext cx="0" cy="515225"/>
-            </a:xfrm>
-            <a:prstGeom prst="straightConnector1">
-              <a:avLst/>
-            </a:prstGeom>
-            <a:ln>
-              <a:tailEnd type="triangle"/>
-            </a:ln>
-          </p:spPr>
-          <p:style>
-            <a:lnRef idx="1">
-              <a:schemeClr val="accent1"/>
-            </a:lnRef>
-            <a:fillRef idx="0">
-              <a:schemeClr val="accent1"/>
-            </a:fillRef>
-            <a:effectRef idx="0">
-              <a:schemeClr val="accent1"/>
-            </a:effectRef>
-            <a:fontRef idx="minor">
-              <a:schemeClr val="tx1"/>
-            </a:fontRef>
-          </p:style>
-        </p:cxnSp>
-        <p:cxnSp>
-          <p:nvCxnSpPr>
-            <p:cNvPr id="32" name="Straight Arrow Connector 31">
-              <a:extLst>
-                <a:ext uri="{FF2B5EF4-FFF2-40B4-BE49-F238E27FC236}">
-                  <a16:creationId xmlns:a16="http://schemas.microsoft.com/office/drawing/2014/main" id="{FBDB1655-CE80-3C24-1593-E411D825086A}"/>
-                </a:ext>
-              </a:extLst>
-            </p:cNvPr>
-            <p:cNvCxnSpPr>
-              <a:stCxn id="9" idx="2"/>
-              <a:endCxn id="7" idx="0"/>
-            </p:cNvCxnSpPr>
-            <p:nvPr/>
-          </p:nvCxnSpPr>
-          <p:spPr>
-            <a:xfrm>
-              <a:off x="2661447" y="1524411"/>
-              <a:ext cx="0" cy="502532"/>
-            </a:xfrm>
-            <a:prstGeom prst="straightConnector1">
-              <a:avLst/>
-            </a:prstGeom>
-            <a:ln>
-              <a:tailEnd type="triangle"/>
-            </a:ln>
-          </p:spPr>
-          <p:style>
-            <a:lnRef idx="1">
-              <a:schemeClr val="accent1"/>
-            </a:lnRef>
-            <a:fillRef idx="0">
-              <a:schemeClr val="accent1"/>
-            </a:fillRef>
-            <a:effectRef idx="0">
-              <a:schemeClr val="accent1"/>
-            </a:effectRef>
-            <a:fontRef idx="minor">
-              <a:schemeClr val="tx1"/>
-            </a:fontRef>
-          </p:style>
-        </p:cxnSp>
-        <p:sp>
-          <p:nvSpPr>
-            <p:cNvPr id="33" name="TextBox 32">
-              <a:extLst>
-                <a:ext uri="{FF2B5EF4-FFF2-40B4-BE49-F238E27FC236}">
-                  <a16:creationId xmlns:a16="http://schemas.microsoft.com/office/drawing/2014/main" id="{6CCF4561-0E90-C505-1F9D-8D32A4878271}"/>
-                </a:ext>
-              </a:extLst>
-            </p:cNvPr>
-            <p:cNvSpPr txBox="1"/>
-            <p:nvPr/>
-          </p:nvSpPr>
-          <p:spPr>
-            <a:xfrm>
-              <a:off x="2047254" y="4154392"/>
-              <a:ext cx="1249360" cy="270843"/>
-            </a:xfrm>
-            <a:prstGeom prst="rect">
-              <a:avLst/>
-            </a:prstGeom>
-            <a:noFill/>
-          </p:spPr>
-          <p:txBody>
-            <a:bodyPr wrap="square">
-              <a:noAutofit/>
-            </a:bodyPr>
-            <a:lstStyle/>
-            <a:p>
-              <a:pPr algn="ctr"/>
-              <a:r>
-                <a:rPr lang="en-US" sz="1100" dirty="0"/>
-                <a:t>Asari workflow</a:t>
-              </a:r>
-            </a:p>
-          </p:txBody>
-        </p:sp>
-      </p:grpSp>
+            </a:solidFill>
+          </a:ln>
+        </p:spPr>
+        <p:txBody>
+          <a:bodyPr wrap="none" rtlCol="0">
+            <a:noAutofit/>
+          </a:bodyPr>
+          <a:lstStyle/>
+          <a:p>
+            <a:pPr algn="ctr"/>
+            <a:r>
+              <a:rPr lang="en-US" sz="1100" dirty="0"/>
+              <a:t>Gene</a:t>
+            </a:r>
+          </a:p>
+        </p:txBody>
+      </p:sp>
+      <p:sp>
+        <p:nvSpPr>
+          <p:cNvPr id="19" name="TextBox 18">
+            <a:extLst>
+              <a:ext uri="{FF2B5EF4-FFF2-40B4-BE49-F238E27FC236}">
+                <a16:creationId xmlns:a16="http://schemas.microsoft.com/office/drawing/2014/main" id="{2529FADF-7268-35D3-C5F8-0D1E6EA3C592}"/>
+              </a:ext>
+            </a:extLst>
+          </p:cNvPr>
+          <p:cNvSpPr txBox="1"/>
+          <p:nvPr/>
+        </p:nvSpPr>
+        <p:spPr>
+          <a:xfrm>
+            <a:off x="6649860" y="3761504"/>
+            <a:ext cx="1005840" cy="438912"/>
+          </a:xfrm>
+          <a:prstGeom prst="rect">
+            <a:avLst/>
+          </a:prstGeom>
+          <a:noFill/>
+          <a:ln>
+            <a:solidFill>
+              <a:schemeClr val="bg1">
+                <a:lumMod val="50000"/>
+              </a:schemeClr>
+            </a:solidFill>
+          </a:ln>
+        </p:spPr>
+        <p:txBody>
+          <a:bodyPr wrap="none" rtlCol="0">
+            <a:noAutofit/>
+          </a:bodyPr>
+          <a:lstStyle/>
+          <a:p>
+            <a:pPr algn="ctr"/>
+            <a:r>
+              <a:rPr lang="en-US" sz="1100" dirty="0"/>
+              <a:t>Compound</a:t>
+            </a:r>
+          </a:p>
+          <a:p>
+            <a:pPr algn="ctr"/>
+            <a:r>
+              <a:rPr lang="en-US" sz="1100" dirty="0"/>
+              <a:t>(Metabolite)</a:t>
+            </a:r>
+          </a:p>
+        </p:txBody>
+      </p:sp>
+      <p:cxnSp>
+        <p:nvCxnSpPr>
+          <p:cNvPr id="20" name="Elbow Connector 19">
+            <a:extLst>
+              <a:ext uri="{FF2B5EF4-FFF2-40B4-BE49-F238E27FC236}">
+                <a16:creationId xmlns:a16="http://schemas.microsoft.com/office/drawing/2014/main" id="{090B8867-F728-4BA5-D3AF-7E6A4E14CFF3}"/>
+              </a:ext>
+            </a:extLst>
+          </p:cNvPr>
+          <p:cNvCxnSpPr>
+            <a:stCxn id="12" idx="2"/>
+            <a:endCxn id="8" idx="1"/>
+          </p:cNvCxnSpPr>
+          <p:nvPr/>
+        </p:nvCxnSpPr>
+        <p:spPr>
+          <a:xfrm rot="16200000" flipH="1">
+            <a:off x="2598640" y="2653941"/>
+            <a:ext cx="1424022" cy="1221150"/>
+          </a:xfrm>
+          <a:prstGeom prst="bentConnector2">
+            <a:avLst/>
+          </a:prstGeom>
+          <a:ln>
+            <a:prstDash val="dash"/>
+            <a:tailEnd type="triangle"/>
+          </a:ln>
+        </p:spPr>
+        <p:style>
+          <a:lnRef idx="1">
+            <a:schemeClr val="accent1"/>
+          </a:lnRef>
+          <a:fillRef idx="0">
+            <a:schemeClr val="accent1"/>
+          </a:fillRef>
+          <a:effectRef idx="0">
+            <a:schemeClr val="accent1"/>
+          </a:effectRef>
+          <a:fontRef idx="minor">
+            <a:schemeClr val="tx1"/>
+          </a:fontRef>
+        </p:style>
+      </p:cxnSp>
+      <p:cxnSp>
+        <p:nvCxnSpPr>
+          <p:cNvPr id="21" name="Straight Arrow Connector 20">
+            <a:extLst>
+              <a:ext uri="{FF2B5EF4-FFF2-40B4-BE49-F238E27FC236}">
+                <a16:creationId xmlns:a16="http://schemas.microsoft.com/office/drawing/2014/main" id="{3B5BD2A7-5766-510D-0EEE-15948FB28549}"/>
+              </a:ext>
+            </a:extLst>
+          </p:cNvPr>
+          <p:cNvCxnSpPr>
+            <a:cxnSpLocks/>
+            <a:stCxn id="8" idx="3"/>
+            <a:endCxn id="19" idx="1"/>
+          </p:cNvCxnSpPr>
+          <p:nvPr/>
+        </p:nvCxnSpPr>
+        <p:spPr>
+          <a:xfrm>
+            <a:off x="4927066" y="3976527"/>
+            <a:ext cx="1722794" cy="4433"/>
+          </a:xfrm>
+          <a:prstGeom prst="straightConnector1">
+            <a:avLst/>
+          </a:prstGeom>
+          <a:ln>
+            <a:prstDash val="dash"/>
+            <a:tailEnd type="triangle"/>
+          </a:ln>
+        </p:spPr>
+        <p:style>
+          <a:lnRef idx="1">
+            <a:schemeClr val="accent1"/>
+          </a:lnRef>
+          <a:fillRef idx="0">
+            <a:schemeClr val="accent1"/>
+          </a:fillRef>
+          <a:effectRef idx="0">
+            <a:schemeClr val="accent1"/>
+          </a:effectRef>
+          <a:fontRef idx="minor">
+            <a:schemeClr val="tx1"/>
+          </a:fontRef>
+        </p:style>
+      </p:cxnSp>
+      <p:cxnSp>
+        <p:nvCxnSpPr>
+          <p:cNvPr id="22" name="Straight Arrow Connector 21">
+            <a:extLst>
+              <a:ext uri="{FF2B5EF4-FFF2-40B4-BE49-F238E27FC236}">
+                <a16:creationId xmlns:a16="http://schemas.microsoft.com/office/drawing/2014/main" id="{5065F5F1-DC40-50D5-D64F-4477A776CB50}"/>
+              </a:ext>
+            </a:extLst>
+          </p:cNvPr>
+          <p:cNvCxnSpPr>
+            <a:stCxn id="11" idx="2"/>
+            <a:endCxn id="12" idx="0"/>
+          </p:cNvCxnSpPr>
+          <p:nvPr/>
+        </p:nvCxnSpPr>
+        <p:spPr>
+          <a:xfrm>
+            <a:off x="2700076" y="1675513"/>
+            <a:ext cx="0" cy="606149"/>
+          </a:xfrm>
+          <a:prstGeom prst="straightConnector1">
+            <a:avLst/>
+          </a:prstGeom>
+          <a:ln>
+            <a:tailEnd type="triangle"/>
+          </a:ln>
+        </p:spPr>
+        <p:style>
+          <a:lnRef idx="1">
+            <a:schemeClr val="accent1"/>
+          </a:lnRef>
+          <a:fillRef idx="0">
+            <a:schemeClr val="accent1"/>
+          </a:fillRef>
+          <a:effectRef idx="0">
+            <a:schemeClr val="accent1"/>
+          </a:effectRef>
+          <a:fontRef idx="minor">
+            <a:schemeClr val="tx1"/>
+          </a:fontRef>
+        </p:style>
+      </p:cxnSp>
+      <p:cxnSp>
+        <p:nvCxnSpPr>
+          <p:cNvPr id="23" name="Straight Arrow Connector 22">
+            <a:extLst>
+              <a:ext uri="{FF2B5EF4-FFF2-40B4-BE49-F238E27FC236}">
+                <a16:creationId xmlns:a16="http://schemas.microsoft.com/office/drawing/2014/main" id="{A98CFF50-0CC9-A788-2CB0-4E3AE00B1C95}"/>
+              </a:ext>
+            </a:extLst>
+          </p:cNvPr>
+          <p:cNvCxnSpPr>
+            <a:stCxn id="12" idx="3"/>
+            <a:endCxn id="9" idx="1"/>
+          </p:cNvCxnSpPr>
+          <p:nvPr/>
+        </p:nvCxnSpPr>
+        <p:spPr>
+          <a:xfrm>
+            <a:off x="3202996" y="2417084"/>
+            <a:ext cx="718230" cy="0"/>
+          </a:xfrm>
+          <a:prstGeom prst="straightConnector1">
+            <a:avLst/>
+          </a:prstGeom>
+          <a:ln>
+            <a:tailEnd type="triangle"/>
+          </a:ln>
+        </p:spPr>
+        <p:style>
+          <a:lnRef idx="1">
+            <a:schemeClr val="accent1"/>
+          </a:lnRef>
+          <a:fillRef idx="0">
+            <a:schemeClr val="accent1"/>
+          </a:fillRef>
+          <a:effectRef idx="0">
+            <a:schemeClr val="accent1"/>
+          </a:effectRef>
+          <a:fontRef idx="minor">
+            <a:schemeClr val="tx1"/>
+          </a:fontRef>
+        </p:style>
+      </p:cxnSp>
+      <p:cxnSp>
+        <p:nvCxnSpPr>
+          <p:cNvPr id="24" name="Straight Arrow Connector 23">
+            <a:extLst>
+              <a:ext uri="{FF2B5EF4-FFF2-40B4-BE49-F238E27FC236}">
+                <a16:creationId xmlns:a16="http://schemas.microsoft.com/office/drawing/2014/main" id="{EC136F5C-C9E9-FE29-FB29-DF41EDFA14DE}"/>
+              </a:ext>
+            </a:extLst>
+          </p:cNvPr>
+          <p:cNvCxnSpPr>
+            <a:cxnSpLocks/>
+            <a:stCxn id="8" idx="2"/>
+            <a:endCxn id="6" idx="0"/>
+          </p:cNvCxnSpPr>
+          <p:nvPr/>
+        </p:nvCxnSpPr>
+        <p:spPr>
+          <a:xfrm>
+            <a:off x="4424146" y="4111948"/>
+            <a:ext cx="0" cy="474724"/>
+          </a:xfrm>
+          <a:prstGeom prst="straightConnector1">
+            <a:avLst/>
+          </a:prstGeom>
+          <a:ln>
+            <a:tailEnd type="triangle"/>
+          </a:ln>
+        </p:spPr>
+        <p:style>
+          <a:lnRef idx="1">
+            <a:schemeClr val="accent1"/>
+          </a:lnRef>
+          <a:fillRef idx="0">
+            <a:schemeClr val="accent1"/>
+          </a:fillRef>
+          <a:effectRef idx="0">
+            <a:schemeClr val="accent1"/>
+          </a:effectRef>
+          <a:fontRef idx="minor">
+            <a:schemeClr val="tx1"/>
+          </a:fontRef>
+        </p:style>
+      </p:cxnSp>
+      <p:cxnSp>
+        <p:nvCxnSpPr>
+          <p:cNvPr id="25" name="Elbow Connector 24">
+            <a:extLst>
+              <a:ext uri="{FF2B5EF4-FFF2-40B4-BE49-F238E27FC236}">
+                <a16:creationId xmlns:a16="http://schemas.microsoft.com/office/drawing/2014/main" id="{EBCDC23A-850A-11F8-345A-CD67406C30D6}"/>
+              </a:ext>
+            </a:extLst>
+          </p:cNvPr>
+          <p:cNvCxnSpPr>
+            <a:cxnSpLocks/>
+            <a:stCxn id="6" idx="3"/>
+            <a:endCxn id="19" idx="2"/>
+          </p:cNvCxnSpPr>
+          <p:nvPr/>
+        </p:nvCxnSpPr>
+        <p:spPr>
+          <a:xfrm flipV="1">
+            <a:off x="4927066" y="4200416"/>
+            <a:ext cx="2225714" cy="606317"/>
+          </a:xfrm>
+          <a:prstGeom prst="bentConnector2">
+            <a:avLst/>
+          </a:prstGeom>
+          <a:ln>
+            <a:tailEnd type="triangle"/>
+          </a:ln>
+        </p:spPr>
+        <p:style>
+          <a:lnRef idx="1">
+            <a:schemeClr val="accent1"/>
+          </a:lnRef>
+          <a:fillRef idx="0">
+            <a:schemeClr val="accent1"/>
+          </a:fillRef>
+          <a:effectRef idx="0">
+            <a:schemeClr val="accent1"/>
+          </a:effectRef>
+          <a:fontRef idx="minor">
+            <a:schemeClr val="tx1"/>
+          </a:fontRef>
+        </p:style>
+      </p:cxnSp>
+      <p:cxnSp>
+        <p:nvCxnSpPr>
+          <p:cNvPr id="26" name="Straight Arrow Connector 25">
+            <a:extLst>
+              <a:ext uri="{FF2B5EF4-FFF2-40B4-BE49-F238E27FC236}">
+                <a16:creationId xmlns:a16="http://schemas.microsoft.com/office/drawing/2014/main" id="{24B3A8F0-CCCE-2E7C-B7FD-D876E65E5E78}"/>
+              </a:ext>
+            </a:extLst>
+          </p:cNvPr>
+          <p:cNvCxnSpPr>
+            <a:cxnSpLocks/>
+          </p:cNvCxnSpPr>
+          <p:nvPr/>
+        </p:nvCxnSpPr>
+        <p:spPr>
+          <a:xfrm>
+            <a:off x="5960561" y="2552505"/>
+            <a:ext cx="0" cy="502532"/>
+          </a:xfrm>
+          <a:prstGeom prst="straightConnector1">
+            <a:avLst/>
+          </a:prstGeom>
+          <a:ln>
+            <a:tailEnd type="triangle"/>
+          </a:ln>
+        </p:spPr>
+        <p:style>
+          <a:lnRef idx="1">
+            <a:schemeClr val="accent1"/>
+          </a:lnRef>
+          <a:fillRef idx="0">
+            <a:schemeClr val="accent1"/>
+          </a:fillRef>
+          <a:effectRef idx="0">
+            <a:schemeClr val="accent1"/>
+          </a:effectRef>
+          <a:fontRef idx="minor">
+            <a:schemeClr val="tx1"/>
+          </a:fontRef>
+        </p:style>
+      </p:cxnSp>
+      <p:cxnSp>
+        <p:nvCxnSpPr>
+          <p:cNvPr id="27" name="Straight Arrow Connector 26">
+            <a:extLst>
+              <a:ext uri="{FF2B5EF4-FFF2-40B4-BE49-F238E27FC236}">
+                <a16:creationId xmlns:a16="http://schemas.microsoft.com/office/drawing/2014/main" id="{BABF3647-BFED-08A5-55D4-F41D837B7E80}"/>
+              </a:ext>
+            </a:extLst>
+          </p:cNvPr>
+          <p:cNvCxnSpPr>
+            <a:stCxn id="16" idx="0"/>
+            <a:endCxn id="15" idx="2"/>
+          </p:cNvCxnSpPr>
+          <p:nvPr/>
+        </p:nvCxnSpPr>
+        <p:spPr>
+          <a:xfrm flipV="1">
+            <a:off x="7152780" y="2552505"/>
+            <a:ext cx="0" cy="502532"/>
+          </a:xfrm>
+          <a:prstGeom prst="straightConnector1">
+            <a:avLst/>
+          </a:prstGeom>
+          <a:ln>
+            <a:tailEnd type="triangle"/>
+          </a:ln>
+        </p:spPr>
+        <p:style>
+          <a:lnRef idx="1">
+            <a:schemeClr val="accent1"/>
+          </a:lnRef>
+          <a:fillRef idx="0">
+            <a:schemeClr val="accent1"/>
+          </a:fillRef>
+          <a:effectRef idx="0">
+            <a:schemeClr val="accent1"/>
+          </a:effectRef>
+          <a:fontRef idx="minor">
+            <a:schemeClr val="tx1"/>
+          </a:fontRef>
+        </p:style>
+      </p:cxnSp>
+      <p:cxnSp>
+        <p:nvCxnSpPr>
+          <p:cNvPr id="28" name="Straight Arrow Connector 27">
+            <a:extLst>
+              <a:ext uri="{FF2B5EF4-FFF2-40B4-BE49-F238E27FC236}">
+                <a16:creationId xmlns:a16="http://schemas.microsoft.com/office/drawing/2014/main" id="{F67F79DE-A841-EAE7-6679-45F52CA61A9E}"/>
+              </a:ext>
+            </a:extLst>
+          </p:cNvPr>
+          <p:cNvCxnSpPr>
+            <a:stCxn id="17" idx="3"/>
+            <a:endCxn id="16" idx="1"/>
+          </p:cNvCxnSpPr>
+          <p:nvPr/>
+        </p:nvCxnSpPr>
+        <p:spPr>
+          <a:xfrm>
+            <a:off x="6362897" y="3190459"/>
+            <a:ext cx="387547" cy="0"/>
+          </a:xfrm>
+          <a:prstGeom prst="straightConnector1">
+            <a:avLst/>
+          </a:prstGeom>
+          <a:ln>
+            <a:tailEnd type="triangle"/>
+          </a:ln>
+        </p:spPr>
+        <p:style>
+          <a:lnRef idx="1">
+            <a:schemeClr val="accent1"/>
+          </a:lnRef>
+          <a:fillRef idx="0">
+            <a:schemeClr val="accent1"/>
+          </a:fillRef>
+          <a:effectRef idx="0">
+            <a:schemeClr val="accent1"/>
+          </a:effectRef>
+          <a:fontRef idx="minor">
+            <a:schemeClr val="tx1"/>
+          </a:fontRef>
+        </p:style>
+      </p:cxnSp>
+      <p:cxnSp>
+        <p:nvCxnSpPr>
+          <p:cNvPr id="29" name="Straight Arrow Connector 28">
+            <a:extLst>
+              <a:ext uri="{FF2B5EF4-FFF2-40B4-BE49-F238E27FC236}">
+                <a16:creationId xmlns:a16="http://schemas.microsoft.com/office/drawing/2014/main" id="{CE87DE2C-63EB-1264-6AF4-A0C9F164E522}"/>
+              </a:ext>
+            </a:extLst>
+          </p:cNvPr>
+          <p:cNvCxnSpPr>
+            <a:stCxn id="16" idx="3"/>
+            <a:endCxn id="14" idx="1"/>
+          </p:cNvCxnSpPr>
+          <p:nvPr/>
+        </p:nvCxnSpPr>
+        <p:spPr>
+          <a:xfrm>
+            <a:off x="7555116" y="3190459"/>
+            <a:ext cx="405148" cy="0"/>
+          </a:xfrm>
+          <a:prstGeom prst="straightConnector1">
+            <a:avLst/>
+          </a:prstGeom>
+          <a:ln>
+            <a:tailEnd type="triangle"/>
+          </a:ln>
+        </p:spPr>
+        <p:style>
+          <a:lnRef idx="1">
+            <a:schemeClr val="accent1"/>
+          </a:lnRef>
+          <a:fillRef idx="0">
+            <a:schemeClr val="accent1"/>
+          </a:fillRef>
+          <a:effectRef idx="0">
+            <a:schemeClr val="accent1"/>
+          </a:effectRef>
+          <a:fontRef idx="minor">
+            <a:schemeClr val="tx1"/>
+          </a:fontRef>
+        </p:style>
+      </p:cxnSp>
+      <p:cxnSp>
+        <p:nvCxnSpPr>
+          <p:cNvPr id="30" name="Straight Arrow Connector 29">
+            <a:extLst>
+              <a:ext uri="{FF2B5EF4-FFF2-40B4-BE49-F238E27FC236}">
+                <a16:creationId xmlns:a16="http://schemas.microsoft.com/office/drawing/2014/main" id="{5FE6753F-E9F4-31AE-B3EB-6A70BD4D259C}"/>
+              </a:ext>
+            </a:extLst>
+          </p:cNvPr>
+          <p:cNvCxnSpPr>
+            <a:cxnSpLocks/>
+            <a:stCxn id="19" idx="0"/>
+            <a:endCxn id="16" idx="2"/>
+          </p:cNvCxnSpPr>
+          <p:nvPr/>
+        </p:nvCxnSpPr>
+        <p:spPr>
+          <a:xfrm flipV="1">
+            <a:off x="7152780" y="3325880"/>
+            <a:ext cx="0" cy="435624"/>
+          </a:xfrm>
+          <a:prstGeom prst="straightConnector1">
+            <a:avLst/>
+          </a:prstGeom>
+          <a:ln>
+            <a:tailEnd type="triangle"/>
+          </a:ln>
+        </p:spPr>
+        <p:style>
+          <a:lnRef idx="1">
+            <a:schemeClr val="accent1"/>
+          </a:lnRef>
+          <a:fillRef idx="0">
+            <a:schemeClr val="accent1"/>
+          </a:fillRef>
+          <a:effectRef idx="0">
+            <a:schemeClr val="accent1"/>
+          </a:effectRef>
+          <a:fontRef idx="minor">
+            <a:schemeClr val="tx1"/>
+          </a:fontRef>
+        </p:style>
+      </p:cxnSp>
+      <p:cxnSp>
+        <p:nvCxnSpPr>
+          <p:cNvPr id="31" name="Straight Arrow Connector 30">
+            <a:extLst>
+              <a:ext uri="{FF2B5EF4-FFF2-40B4-BE49-F238E27FC236}">
+                <a16:creationId xmlns:a16="http://schemas.microsoft.com/office/drawing/2014/main" id="{978DECFF-B467-7A95-610B-86E8A9E252DB}"/>
+              </a:ext>
+            </a:extLst>
+          </p:cNvPr>
+          <p:cNvCxnSpPr>
+            <a:stCxn id="7" idx="2"/>
+            <a:endCxn id="8" idx="0"/>
+          </p:cNvCxnSpPr>
+          <p:nvPr/>
+        </p:nvCxnSpPr>
+        <p:spPr>
+          <a:xfrm>
+            <a:off x="4424146" y="3325880"/>
+            <a:ext cx="0" cy="515225"/>
+          </a:xfrm>
+          <a:prstGeom prst="straightConnector1">
+            <a:avLst/>
+          </a:prstGeom>
+          <a:ln>
+            <a:tailEnd type="triangle"/>
+          </a:ln>
+        </p:spPr>
+        <p:style>
+          <a:lnRef idx="1">
+            <a:schemeClr val="accent1"/>
+          </a:lnRef>
+          <a:fillRef idx="0">
+            <a:schemeClr val="accent1"/>
+          </a:fillRef>
+          <a:effectRef idx="0">
+            <a:schemeClr val="accent1"/>
+          </a:effectRef>
+          <a:fontRef idx="minor">
+            <a:schemeClr val="tx1"/>
+          </a:fontRef>
+        </p:style>
+      </p:cxnSp>
+      <p:cxnSp>
+        <p:nvCxnSpPr>
+          <p:cNvPr id="32" name="Straight Arrow Connector 31">
+            <a:extLst>
+              <a:ext uri="{FF2B5EF4-FFF2-40B4-BE49-F238E27FC236}">
+                <a16:creationId xmlns:a16="http://schemas.microsoft.com/office/drawing/2014/main" id="{FBDB1655-CE80-3C24-1593-E411D825086A}"/>
+              </a:ext>
+            </a:extLst>
+          </p:cNvPr>
+          <p:cNvCxnSpPr>
+            <a:stCxn id="9" idx="2"/>
+            <a:endCxn id="7" idx="0"/>
+          </p:cNvCxnSpPr>
+          <p:nvPr/>
+        </p:nvCxnSpPr>
+        <p:spPr>
+          <a:xfrm>
+            <a:off x="4424146" y="2552505"/>
+            <a:ext cx="0" cy="502532"/>
+          </a:xfrm>
+          <a:prstGeom prst="straightConnector1">
+            <a:avLst/>
+          </a:prstGeom>
+          <a:ln>
+            <a:tailEnd type="triangle"/>
+          </a:ln>
+        </p:spPr>
+        <p:style>
+          <a:lnRef idx="1">
+            <a:schemeClr val="accent1"/>
+          </a:lnRef>
+          <a:fillRef idx="0">
+            <a:schemeClr val="accent1"/>
+          </a:fillRef>
+          <a:effectRef idx="0">
+            <a:schemeClr val="accent1"/>
+          </a:effectRef>
+          <a:fontRef idx="minor">
+            <a:schemeClr val="tx1"/>
+          </a:fontRef>
+        </p:style>
+      </p:cxnSp>
+      <p:sp>
+        <p:nvSpPr>
+          <p:cNvPr id="33" name="TextBox 32">
+            <a:extLst>
+              <a:ext uri="{FF2B5EF4-FFF2-40B4-BE49-F238E27FC236}">
+                <a16:creationId xmlns:a16="http://schemas.microsoft.com/office/drawing/2014/main" id="{6CCF4561-0E90-C505-1F9D-8D32A4878271}"/>
+              </a:ext>
+            </a:extLst>
+          </p:cNvPr>
+          <p:cNvSpPr txBox="1"/>
+          <p:nvPr/>
+        </p:nvSpPr>
+        <p:spPr>
+          <a:xfrm>
+            <a:off x="3677706" y="6281311"/>
+            <a:ext cx="1249360" cy="270843"/>
+          </a:xfrm>
+          <a:prstGeom prst="rect">
+            <a:avLst/>
+          </a:prstGeom>
+          <a:noFill/>
+        </p:spPr>
+        <p:txBody>
+          <a:bodyPr wrap="square">
+            <a:noAutofit/>
+          </a:bodyPr>
+          <a:lstStyle/>
+          <a:p>
+            <a:pPr algn="ctr"/>
+            <a:r>
+              <a:rPr lang="en-US" sz="1100" dirty="0"/>
+              <a:t>Asari workflow</a:t>
+            </a:r>
+          </a:p>
+        </p:txBody>
+      </p:sp>
       <p:sp>
         <p:nvSpPr>
           <p:cNvPr id="34" name="TextBox 33">
@@ -4778,6 +4757,131 @@
               <a:rPr lang="en-US" sz="2000" dirty="0"/>
               <a:t>: Basic data structure in Computational Metabolomics</a:t>
             </a:r>
+          </a:p>
+        </p:txBody>
+      </p:sp>
+      <p:cxnSp>
+        <p:nvCxnSpPr>
+          <p:cNvPr id="35" name="Elbow Connector 34">
+            <a:extLst>
+              <a:ext uri="{FF2B5EF4-FFF2-40B4-BE49-F238E27FC236}">
+                <a16:creationId xmlns:a16="http://schemas.microsoft.com/office/drawing/2014/main" id="{8107346C-6E91-C180-47E3-884BB49701CF}"/>
+              </a:ext>
+            </a:extLst>
+          </p:cNvPr>
+          <p:cNvCxnSpPr>
+            <a:cxnSpLocks/>
+          </p:cNvCxnSpPr>
+          <p:nvPr/>
+        </p:nvCxnSpPr>
+        <p:spPr>
+          <a:xfrm>
+            <a:off x="2708256" y="3976886"/>
+            <a:ext cx="1207008" cy="804672"/>
+          </a:xfrm>
+          <a:prstGeom prst="bentConnector3">
+            <a:avLst>
+              <a:gd name="adj1" fmla="val -665"/>
+            </a:avLst>
+          </a:prstGeom>
+          <a:ln>
+            <a:prstDash val="dash"/>
+            <a:tailEnd type="triangle"/>
+          </a:ln>
+        </p:spPr>
+        <p:style>
+          <a:lnRef idx="1">
+            <a:schemeClr val="accent1"/>
+          </a:lnRef>
+          <a:fillRef idx="0">
+            <a:schemeClr val="accent1"/>
+          </a:fillRef>
+          <a:effectRef idx="0">
+            <a:schemeClr val="accent1"/>
+          </a:effectRef>
+          <a:fontRef idx="minor">
+            <a:schemeClr val="tx1"/>
+          </a:fontRef>
+        </p:style>
+      </p:cxnSp>
+      <p:sp>
+        <p:nvSpPr>
+          <p:cNvPr id="38" name="TextBox 37">
+            <a:extLst>
+              <a:ext uri="{FF2B5EF4-FFF2-40B4-BE49-F238E27FC236}">
+                <a16:creationId xmlns:a16="http://schemas.microsoft.com/office/drawing/2014/main" id="{123F897D-A83B-8D91-D4F6-B033F4756D3C}"/>
+              </a:ext>
+            </a:extLst>
+          </p:cNvPr>
+          <p:cNvSpPr txBox="1"/>
+          <p:nvPr/>
+        </p:nvSpPr>
+        <p:spPr>
+          <a:xfrm>
+            <a:off x="3201481" y="2166520"/>
+            <a:ext cx="433162" cy="270843"/>
+          </a:xfrm>
+          <a:prstGeom prst="rect">
+            <a:avLst/>
+          </a:prstGeom>
+          <a:noFill/>
+        </p:spPr>
+        <p:txBody>
+          <a:bodyPr wrap="square">
+            <a:noAutofit/>
+          </a:bodyPr>
+          <a:lstStyle/>
+          <a:p>
+            <a:pPr algn="ctr"/>
+            <a:r>
+              <a:rPr lang="en-US" sz="1100" dirty="0"/>
+              <a:t>MS</a:t>
+            </a:r>
+            <a:r>
+              <a:rPr lang="en-US" sz="1100" baseline="30000" dirty="0"/>
+              <a:t>1</a:t>
+            </a:r>
+          </a:p>
+        </p:txBody>
+      </p:sp>
+      <p:sp>
+        <p:nvSpPr>
+          <p:cNvPr id="39" name="TextBox 38">
+            <a:extLst>
+              <a:ext uri="{FF2B5EF4-FFF2-40B4-BE49-F238E27FC236}">
+                <a16:creationId xmlns:a16="http://schemas.microsoft.com/office/drawing/2014/main" id="{7D31F7DB-E516-60E8-D5B5-9F192793F743}"/>
+              </a:ext>
+            </a:extLst>
+          </p:cNvPr>
+          <p:cNvSpPr txBox="1"/>
+          <p:nvPr/>
+        </p:nvSpPr>
+        <p:spPr>
+          <a:xfrm>
+            <a:off x="2291101" y="4531811"/>
+            <a:ext cx="433162" cy="270843"/>
+          </a:xfrm>
+          <a:prstGeom prst="rect">
+            <a:avLst/>
+          </a:prstGeom>
+          <a:noFill/>
+        </p:spPr>
+        <p:txBody>
+          <a:bodyPr wrap="square">
+            <a:noAutofit/>
+          </a:bodyPr>
+          <a:lstStyle/>
+          <a:p>
+            <a:pPr algn="ctr"/>
+            <a:r>
+              <a:rPr lang="en-US" sz="1100" dirty="0" err="1"/>
+              <a:t>MS</a:t>
+            </a:r>
+            <a:r>
+              <a:rPr lang="en-US" sz="1100" baseline="30000" dirty="0" err="1"/>
+              <a:t>n</a:t>
+            </a:r>
+            <a:endParaRPr lang="en-US" sz="1100" baseline="30000" dirty="0"/>
           </a:p>
         </p:txBody>
       </p:sp>

</xml_diff>